<commit_message>
updated Presentationwith Webhook diagram
</commit_message>
<xml_diff>
--- a/docs/Latch_tu_Flutter.pptx
+++ b/docs/Latch_tu_Flutter.pptx
@@ -5,8 +5,9 @@
     <p:sldMasterId id="2147483648" r:id="rId1"/>
   </p:sldMasterIdLst>
   <p:sldIdLst>
-    <p:sldId id="256" r:id="rId2"/>
-    <p:sldId id="257" r:id="rId3"/>
+    <p:sldId id="257" r:id="rId2"/>
+    <p:sldId id="256" r:id="rId3"/>
+    <p:sldId id="258" r:id="rId4"/>
   </p:sldIdLst>
   <p:sldSz cx="12192000" cy="6858000"/>
   <p:notesSz cx="6858000" cy="9144000"/>
@@ -262,7 +263,7 @@
           <a:p>
             <a:fld id="{4466B582-2617-FC41-B4A2-005FCDB5CB8D}" type="datetimeFigureOut">
               <a:rPr lang="en-ES" smtClean="0"/>
-              <a:t>1/3/25</a:t>
+              <a:t>3/3/25</a:t>
             </a:fld>
             <a:endParaRPr lang="en-ES"/>
           </a:p>
@@ -462,7 +463,7 @@
           <a:p>
             <a:fld id="{4466B582-2617-FC41-B4A2-005FCDB5CB8D}" type="datetimeFigureOut">
               <a:rPr lang="en-ES" smtClean="0"/>
-              <a:t>1/3/25</a:t>
+              <a:t>3/3/25</a:t>
             </a:fld>
             <a:endParaRPr lang="en-ES"/>
           </a:p>
@@ -672,7 +673,7 @@
           <a:p>
             <a:fld id="{4466B582-2617-FC41-B4A2-005FCDB5CB8D}" type="datetimeFigureOut">
               <a:rPr lang="en-ES" smtClean="0"/>
-              <a:t>1/3/25</a:t>
+              <a:t>3/3/25</a:t>
             </a:fld>
             <a:endParaRPr lang="en-ES"/>
           </a:p>
@@ -872,7 +873,7 @@
           <a:p>
             <a:fld id="{4466B582-2617-FC41-B4A2-005FCDB5CB8D}" type="datetimeFigureOut">
               <a:rPr lang="en-ES" smtClean="0"/>
-              <a:t>1/3/25</a:t>
+              <a:t>3/3/25</a:t>
             </a:fld>
             <a:endParaRPr lang="en-ES"/>
           </a:p>
@@ -1148,7 +1149,7 @@
           <a:p>
             <a:fld id="{4466B582-2617-FC41-B4A2-005FCDB5CB8D}" type="datetimeFigureOut">
               <a:rPr lang="en-ES" smtClean="0"/>
-              <a:t>1/3/25</a:t>
+              <a:t>3/3/25</a:t>
             </a:fld>
             <a:endParaRPr lang="en-ES"/>
           </a:p>
@@ -1416,7 +1417,7 @@
           <a:p>
             <a:fld id="{4466B582-2617-FC41-B4A2-005FCDB5CB8D}" type="datetimeFigureOut">
               <a:rPr lang="en-ES" smtClean="0"/>
-              <a:t>1/3/25</a:t>
+              <a:t>3/3/25</a:t>
             </a:fld>
             <a:endParaRPr lang="en-ES"/>
           </a:p>
@@ -1831,7 +1832,7 @@
           <a:p>
             <a:fld id="{4466B582-2617-FC41-B4A2-005FCDB5CB8D}" type="datetimeFigureOut">
               <a:rPr lang="en-ES" smtClean="0"/>
-              <a:t>1/3/25</a:t>
+              <a:t>3/3/25</a:t>
             </a:fld>
             <a:endParaRPr lang="en-ES"/>
           </a:p>
@@ -1973,7 +1974,7 @@
           <a:p>
             <a:fld id="{4466B582-2617-FC41-B4A2-005FCDB5CB8D}" type="datetimeFigureOut">
               <a:rPr lang="en-ES" smtClean="0"/>
-              <a:t>1/3/25</a:t>
+              <a:t>3/3/25</a:t>
             </a:fld>
             <a:endParaRPr lang="en-ES"/>
           </a:p>
@@ -2086,7 +2087,7 @@
           <a:p>
             <a:fld id="{4466B582-2617-FC41-B4A2-005FCDB5CB8D}" type="datetimeFigureOut">
               <a:rPr lang="en-ES" smtClean="0"/>
-              <a:t>1/3/25</a:t>
+              <a:t>3/3/25</a:t>
             </a:fld>
             <a:endParaRPr lang="en-ES"/>
           </a:p>
@@ -2399,7 +2400,7 @@
           <a:p>
             <a:fld id="{4466B582-2617-FC41-B4A2-005FCDB5CB8D}" type="datetimeFigureOut">
               <a:rPr lang="en-ES" smtClean="0"/>
-              <a:t>1/3/25</a:t>
+              <a:t>3/3/25</a:t>
             </a:fld>
             <a:endParaRPr lang="en-ES"/>
           </a:p>
@@ -2688,7 +2689,7 @@
           <a:p>
             <a:fld id="{4466B582-2617-FC41-B4A2-005FCDB5CB8D}" type="datetimeFigureOut">
               <a:rPr lang="en-ES" smtClean="0"/>
-              <a:t>1/3/25</a:t>
+              <a:t>3/3/25</a:t>
             </a:fld>
             <a:endParaRPr lang="en-ES"/>
           </a:p>
@@ -2931,7 +2932,7 @@
           <a:p>
             <a:fld id="{4466B582-2617-FC41-B4A2-005FCDB5CB8D}" type="datetimeFigureOut">
               <a:rPr lang="en-ES" smtClean="0"/>
-              <a:t>1/3/25</a:t>
+              <a:t>3/3/25</a:t>
             </a:fld>
             <a:endParaRPr lang="en-ES"/>
           </a:p>
@@ -3348,1191 +3349,26 @@
           <a:chExt cx="0" cy="0"/>
         </a:xfrm>
       </p:grpSpPr>
-      <p:pic>
-        <p:nvPicPr>
-          <p:cNvPr id="37" name="Picture 36" descr="A black background with a black square&#10;&#10;AI-generated content may be incorrect.">
-            <a:extLst>
-              <a:ext uri="{FF2B5EF4-FFF2-40B4-BE49-F238E27FC236}">
-                <a16:creationId xmlns:a16="http://schemas.microsoft.com/office/drawing/2014/main" id="{18A30B91-06AF-8B0C-A96B-4D92DA55D754}"/>
-              </a:ext>
-            </a:extLst>
-          </p:cNvPr>
-          <p:cNvPicPr>
-            <a:picLocks noChangeAspect="1"/>
-          </p:cNvPicPr>
-          <p:nvPr/>
-        </p:nvPicPr>
-        <p:blipFill>
-          <a:blip r:embed="rId2"/>
-          <a:stretch>
-            <a:fillRect/>
-          </a:stretch>
-        </p:blipFill>
-        <p:spPr>
-          <a:xfrm>
-            <a:off x="320331" y="990961"/>
-            <a:ext cx="1866604" cy="2139043"/>
-          </a:xfrm>
-          <a:prstGeom prst="rect">
-            <a:avLst/>
-          </a:prstGeom>
-        </p:spPr>
-      </p:pic>
-      <p:sp>
-        <p:nvSpPr>
-          <p:cNvPr id="24" name="Rounded Rectangle 23">
-            <a:extLst>
-              <a:ext uri="{FF2B5EF4-FFF2-40B4-BE49-F238E27FC236}">
-                <a16:creationId xmlns:a16="http://schemas.microsoft.com/office/drawing/2014/main" id="{C2D5360E-C0A9-B6C5-2679-42B425C74D66}"/>
-              </a:ext>
-            </a:extLst>
-          </p:cNvPr>
-          <p:cNvSpPr/>
-          <p:nvPr/>
-        </p:nvSpPr>
-        <p:spPr>
-          <a:xfrm>
-            <a:off x="4130006" y="2628724"/>
-            <a:ext cx="3973688" cy="1758113"/>
-          </a:xfrm>
-          <a:prstGeom prst="roundRect">
-            <a:avLst/>
-          </a:prstGeom>
-          <a:solidFill>
-            <a:schemeClr val="tx2">
-              <a:lumMod val="10000"/>
-              <a:lumOff val="90000"/>
-            </a:schemeClr>
-          </a:solidFill>
-          <a:ln>
-            <a:noFill/>
-          </a:ln>
-        </p:spPr>
-        <p:style>
-          <a:lnRef idx="2">
-            <a:schemeClr val="accent1">
-              <a:shade val="15000"/>
-            </a:schemeClr>
-          </a:lnRef>
-          <a:fillRef idx="1">
-            <a:schemeClr val="accent1"/>
-          </a:fillRef>
-          <a:effectRef idx="0">
-            <a:schemeClr val="accent1"/>
-          </a:effectRef>
-          <a:fontRef idx="minor">
-            <a:schemeClr val="lt1"/>
-          </a:fontRef>
-        </p:style>
-        <p:txBody>
-          <a:bodyPr rtlCol="0" anchor="ctr"/>
-          <a:lstStyle/>
-          <a:p>
-            <a:pPr algn="ctr"/>
-            <a:endParaRPr lang="en-ES"/>
-          </a:p>
-        </p:txBody>
-      </p:sp>
-      <p:sp>
-        <p:nvSpPr>
-          <p:cNvPr id="44" name="Rounded Rectangle 43">
-            <a:extLst>
-              <a:ext uri="{FF2B5EF4-FFF2-40B4-BE49-F238E27FC236}">
-                <a16:creationId xmlns:a16="http://schemas.microsoft.com/office/drawing/2014/main" id="{57AE673A-5008-DF8B-860A-EB9CC2FD438E}"/>
-              </a:ext>
-            </a:extLst>
-          </p:cNvPr>
-          <p:cNvSpPr/>
-          <p:nvPr/>
-        </p:nvSpPr>
-        <p:spPr>
-          <a:xfrm>
-            <a:off x="4140327" y="4764080"/>
-            <a:ext cx="3973688" cy="1745028"/>
-          </a:xfrm>
-          <a:prstGeom prst="roundRect">
-            <a:avLst/>
-          </a:prstGeom>
-          <a:solidFill>
-            <a:schemeClr val="tx2">
-              <a:lumMod val="10000"/>
-              <a:lumOff val="90000"/>
-            </a:schemeClr>
-          </a:solidFill>
-          <a:ln>
-            <a:noFill/>
-          </a:ln>
-        </p:spPr>
-        <p:style>
-          <a:lnRef idx="2">
-            <a:schemeClr val="accent1">
-              <a:shade val="15000"/>
-            </a:schemeClr>
-          </a:lnRef>
-          <a:fillRef idx="1">
-            <a:schemeClr val="accent1"/>
-          </a:fillRef>
-          <a:effectRef idx="0">
-            <a:schemeClr val="accent1"/>
-          </a:effectRef>
-          <a:fontRef idx="minor">
-            <a:schemeClr val="lt1"/>
-          </a:fontRef>
-        </p:style>
-        <p:txBody>
-          <a:bodyPr rtlCol="0" anchor="ctr"/>
-          <a:lstStyle/>
-          <a:p>
-            <a:pPr algn="ctr"/>
-            <a:endParaRPr lang="en-ES"/>
-          </a:p>
-        </p:txBody>
-      </p:sp>
-      <p:pic>
-        <p:nvPicPr>
-          <p:cNvPr id="5" name="Graphic 4">
-            <a:extLst>
-              <a:ext uri="{FF2B5EF4-FFF2-40B4-BE49-F238E27FC236}">
-                <a16:creationId xmlns:a16="http://schemas.microsoft.com/office/drawing/2014/main" id="{70E26226-035B-198A-002D-E66C0C3169D8}"/>
-              </a:ext>
-            </a:extLst>
-          </p:cNvPr>
-          <p:cNvPicPr>
-            <a:picLocks noChangeAspect="1"/>
-          </p:cNvPicPr>
-          <p:nvPr/>
-        </p:nvPicPr>
-        <p:blipFill>
-          <a:blip r:embed="rId3">
-            <a:extLst>
-              <a:ext uri="{96DAC541-7B7A-43D3-8B79-37D633B846F1}">
-                <asvg:svgBlip xmlns:asvg="http://schemas.microsoft.com/office/drawing/2016/SVG/main" r:embed="rId4"/>
-              </a:ext>
-            </a:extLst>
-          </a:blip>
-          <a:stretch>
-            <a:fillRect/>
-          </a:stretch>
-        </p:blipFill>
-        <p:spPr>
-          <a:xfrm>
-            <a:off x="4552836" y="3024963"/>
-            <a:ext cx="601292" cy="601292"/>
-          </a:xfrm>
-          <a:prstGeom prst="rect">
-            <a:avLst/>
-          </a:prstGeom>
-        </p:spPr>
-      </p:pic>
-      <p:pic>
-        <p:nvPicPr>
-          <p:cNvPr id="7" name="Picture 6">
-            <a:extLst>
-              <a:ext uri="{FF2B5EF4-FFF2-40B4-BE49-F238E27FC236}">
-                <a16:creationId xmlns:a16="http://schemas.microsoft.com/office/drawing/2014/main" id="{B93BF93B-0109-AF3B-3B8C-5261E5C4A94B}"/>
-              </a:ext>
-            </a:extLst>
-          </p:cNvPr>
-          <p:cNvPicPr>
-            <a:picLocks noChangeAspect="1"/>
-          </p:cNvPicPr>
-          <p:nvPr/>
-        </p:nvPicPr>
-        <p:blipFill>
-          <a:blip r:embed="rId5"/>
-          <a:stretch>
-            <a:fillRect/>
-          </a:stretch>
-        </p:blipFill>
-        <p:spPr>
-          <a:xfrm>
-            <a:off x="7695562" y="3812327"/>
-            <a:ext cx="600562" cy="600562"/>
-          </a:xfrm>
-          <a:prstGeom prst="rect">
-            <a:avLst/>
-          </a:prstGeom>
-        </p:spPr>
-      </p:pic>
-      <p:sp>
-        <p:nvSpPr>
-          <p:cNvPr id="12" name="TextBox 11">
-            <a:extLst>
-              <a:ext uri="{FF2B5EF4-FFF2-40B4-BE49-F238E27FC236}">
-                <a16:creationId xmlns:a16="http://schemas.microsoft.com/office/drawing/2014/main" id="{8C3644C6-46DD-1D2A-7004-C7C5044EE00C}"/>
-              </a:ext>
-            </a:extLst>
-          </p:cNvPr>
-          <p:cNvSpPr txBox="1"/>
-          <p:nvPr/>
-        </p:nvSpPr>
-        <p:spPr>
-          <a:xfrm>
-            <a:off x="4441618" y="3654056"/>
-            <a:ext cx="2468625" cy="553998"/>
-          </a:xfrm>
-          <a:prstGeom prst="rect">
-            <a:avLst/>
-          </a:prstGeom>
-          <a:noFill/>
-        </p:spPr>
-        <p:txBody>
-          <a:bodyPr wrap="none" rtlCol="0">
-            <a:spAutoFit/>
-          </a:bodyPr>
-          <a:lstStyle/>
-          <a:p>
-            <a:r>
-              <a:rPr lang="en-ES" sz="1600" i="1" dirty="0"/>
-              <a:t>latch_tu_flutter_api</a:t>
-            </a:r>
-          </a:p>
-          <a:p>
-            <a:r>
-              <a:rPr lang="en-ES" sz="1400" dirty="0"/>
-              <a:t>[App Service / Linux /  Python]</a:t>
-            </a:r>
-          </a:p>
-        </p:txBody>
-      </p:sp>
-      <p:sp>
-        <p:nvSpPr>
-          <p:cNvPr id="13" name="TextBox 12">
-            <a:extLst>
-              <a:ext uri="{FF2B5EF4-FFF2-40B4-BE49-F238E27FC236}">
-                <a16:creationId xmlns:a16="http://schemas.microsoft.com/office/drawing/2014/main" id="{E5EF0589-64A0-19CB-AD08-0777390BA4A7}"/>
-              </a:ext>
-            </a:extLst>
-          </p:cNvPr>
-          <p:cNvSpPr txBox="1"/>
-          <p:nvPr/>
-        </p:nvSpPr>
-        <p:spPr>
-          <a:xfrm>
-            <a:off x="8260928" y="3856902"/>
-            <a:ext cx="955903" cy="523220"/>
-          </a:xfrm>
-          <a:prstGeom prst="rect">
-            <a:avLst/>
-          </a:prstGeom>
-          <a:noFill/>
-        </p:spPr>
-        <p:txBody>
-          <a:bodyPr wrap="none" rtlCol="0">
-            <a:spAutoFit/>
-          </a:bodyPr>
-          <a:lstStyle/>
-          <a:p>
-            <a:r>
-              <a:rPr lang="en-ES" sz="1400" dirty="0"/>
-              <a:t>Microsoft </a:t>
-            </a:r>
-          </a:p>
-          <a:p>
-            <a:r>
-              <a:rPr lang="en-ES" sz="1400" dirty="0"/>
-              <a:t>Azure </a:t>
-            </a:r>
-          </a:p>
-        </p:txBody>
-      </p:sp>
-      <p:pic>
-        <p:nvPicPr>
-          <p:cNvPr id="15" name="Picture 14" descr="A blue and black logo&#10;&#10;AI-generated content may be incorrect.">
-            <a:extLst>
-              <a:ext uri="{FF2B5EF4-FFF2-40B4-BE49-F238E27FC236}">
-                <a16:creationId xmlns:a16="http://schemas.microsoft.com/office/drawing/2014/main" id="{E703145E-5878-4929-FB84-0B5A6E29DBC9}"/>
-              </a:ext>
-            </a:extLst>
-          </p:cNvPr>
-          <p:cNvPicPr>
-            <a:picLocks noChangeAspect="1"/>
-          </p:cNvPicPr>
-          <p:nvPr/>
-        </p:nvPicPr>
-        <p:blipFill>
-          <a:blip r:embed="rId6"/>
-          <a:stretch>
-            <a:fillRect/>
-          </a:stretch>
-        </p:blipFill>
-        <p:spPr>
-          <a:xfrm>
-            <a:off x="926537" y="1997090"/>
-            <a:ext cx="613298" cy="584776"/>
-          </a:xfrm>
-          <a:prstGeom prst="rect">
-            <a:avLst/>
-          </a:prstGeom>
-        </p:spPr>
-      </p:pic>
-      <p:sp>
-        <p:nvSpPr>
-          <p:cNvPr id="16" name="TextBox 15">
-            <a:extLst>
-              <a:ext uri="{FF2B5EF4-FFF2-40B4-BE49-F238E27FC236}">
-                <a16:creationId xmlns:a16="http://schemas.microsoft.com/office/drawing/2014/main" id="{9DE035F7-630F-2CEF-F5CD-DB8D892B1BD7}"/>
-              </a:ext>
-            </a:extLst>
-          </p:cNvPr>
-          <p:cNvSpPr txBox="1"/>
-          <p:nvPr/>
-        </p:nvSpPr>
-        <p:spPr>
-          <a:xfrm>
-            <a:off x="297828" y="3145578"/>
-            <a:ext cx="1962332" cy="553998"/>
-          </a:xfrm>
-          <a:prstGeom prst="rect">
-            <a:avLst/>
-          </a:prstGeom>
-          <a:noFill/>
-        </p:spPr>
-        <p:txBody>
-          <a:bodyPr wrap="none" rtlCol="0">
-            <a:spAutoFit/>
-          </a:bodyPr>
-          <a:lstStyle/>
-          <a:p>
-            <a:r>
-              <a:rPr lang="en-ES" sz="1600" i="1" dirty="0"/>
-              <a:t>latch_tu_flutter_app</a:t>
-            </a:r>
-            <a:endParaRPr lang="en-ES" sz="1600" dirty="0"/>
-          </a:p>
-          <a:p>
-            <a:r>
-              <a:rPr lang="en-ES" sz="1400" dirty="0"/>
-              <a:t>[Flutter / iOS / Android]</a:t>
-            </a:r>
-          </a:p>
-        </p:txBody>
-      </p:sp>
-      <p:pic>
-        <p:nvPicPr>
-          <p:cNvPr id="21" name="Picture 20" descr="A red and yellow drop of water&#10;&#10;AI-generated content may be incorrect.">
-            <a:extLst>
-              <a:ext uri="{FF2B5EF4-FFF2-40B4-BE49-F238E27FC236}">
-                <a16:creationId xmlns:a16="http://schemas.microsoft.com/office/drawing/2014/main" id="{68BE15F8-C93A-5614-49EF-7E4D75951D6B}"/>
-              </a:ext>
-            </a:extLst>
-          </p:cNvPr>
-          <p:cNvPicPr>
-            <a:picLocks noChangeAspect="1"/>
-          </p:cNvPicPr>
-          <p:nvPr/>
-        </p:nvPicPr>
-        <p:blipFill>
-          <a:blip r:embed="rId7">
-            <a:extLst>
-              <a:ext uri="{BEBA8EAE-BF5A-486C-A8C5-ECC9F3942E4B}">
-                <a14:imgProps xmlns:a14="http://schemas.microsoft.com/office/drawing/2010/main">
-                  <a14:imgLayer r:embed="rId8">
-                    <a14:imgEffect>
-                      <a14:backgroundRemoval t="10000" b="90000" l="10000" r="90000"/>
-                    </a14:imgEffect>
-                  </a14:imgLayer>
-                </a14:imgProps>
-              </a:ext>
-            </a:extLst>
-          </a:blip>
-          <a:stretch>
-            <a:fillRect/>
-          </a:stretch>
-        </p:blipFill>
-        <p:spPr>
-          <a:xfrm>
-            <a:off x="4304394" y="4913931"/>
-            <a:ext cx="849734" cy="849734"/>
-          </a:xfrm>
-          <a:prstGeom prst="rect">
-            <a:avLst/>
-          </a:prstGeom>
-        </p:spPr>
-      </p:pic>
-      <p:pic>
-        <p:nvPicPr>
-          <p:cNvPr id="23" name="Picture 22" descr="A rainbow colored circle with a cloud in the center&#10;&#10;AI-generated content may be incorrect.">
-            <a:extLst>
-              <a:ext uri="{FF2B5EF4-FFF2-40B4-BE49-F238E27FC236}">
-                <a16:creationId xmlns:a16="http://schemas.microsoft.com/office/drawing/2014/main" id="{CF1FCABF-766A-405B-8CDB-0EBD54BD8AF2}"/>
-              </a:ext>
-            </a:extLst>
-          </p:cNvPr>
-          <p:cNvPicPr>
-            <a:picLocks noChangeAspect="1"/>
-          </p:cNvPicPr>
-          <p:nvPr/>
-        </p:nvPicPr>
-        <p:blipFill>
-          <a:blip r:embed="rId9"/>
-          <a:stretch>
-            <a:fillRect/>
-          </a:stretch>
-        </p:blipFill>
-        <p:spPr>
-          <a:xfrm>
-            <a:off x="7618179" y="5943050"/>
-            <a:ext cx="712041" cy="572275"/>
-          </a:xfrm>
-          <a:prstGeom prst="rect">
-            <a:avLst/>
-          </a:prstGeom>
-        </p:spPr>
-      </p:pic>
-      <p:cxnSp>
-        <p:nvCxnSpPr>
-          <p:cNvPr id="25" name="Straight Arrow Connector 24">
-            <a:extLst>
-              <a:ext uri="{FF2B5EF4-FFF2-40B4-BE49-F238E27FC236}">
-                <a16:creationId xmlns:a16="http://schemas.microsoft.com/office/drawing/2014/main" id="{941FF940-0AC4-621F-1A1A-FB8A8F5ACBEA}"/>
-              </a:ext>
-            </a:extLst>
-          </p:cNvPr>
-          <p:cNvCxnSpPr>
-            <a:cxnSpLocks/>
-          </p:cNvCxnSpPr>
-          <p:nvPr/>
-        </p:nvCxnSpPr>
-        <p:spPr>
-          <a:xfrm>
-            <a:off x="1608976" y="2483180"/>
-            <a:ext cx="2858690" cy="2649796"/>
-          </a:xfrm>
-          <a:prstGeom prst="straightConnector1">
-            <a:avLst/>
-          </a:prstGeom>
-          <a:ln>
-            <a:tailEnd type="triangle"/>
-          </a:ln>
-        </p:spPr>
-        <p:style>
-          <a:lnRef idx="2">
-            <a:schemeClr val="accent1"/>
-          </a:lnRef>
-          <a:fillRef idx="0">
-            <a:schemeClr val="accent1"/>
-          </a:fillRef>
-          <a:effectRef idx="1">
-            <a:schemeClr val="accent1"/>
-          </a:effectRef>
-          <a:fontRef idx="minor">
-            <a:schemeClr val="tx1"/>
-          </a:fontRef>
-        </p:style>
-      </p:cxnSp>
-      <p:sp>
-        <p:nvSpPr>
-          <p:cNvPr id="33" name="TextBox 32">
-            <a:extLst>
-              <a:ext uri="{FF2B5EF4-FFF2-40B4-BE49-F238E27FC236}">
-                <a16:creationId xmlns:a16="http://schemas.microsoft.com/office/drawing/2014/main" id="{6DF5178F-1C0A-CA63-2D83-76D13F08D70F}"/>
-              </a:ext>
-            </a:extLst>
-          </p:cNvPr>
-          <p:cNvSpPr txBox="1"/>
-          <p:nvPr/>
-        </p:nvSpPr>
-        <p:spPr>
-          <a:xfrm>
-            <a:off x="8263824" y="5842501"/>
-            <a:ext cx="1247457" cy="523220"/>
-          </a:xfrm>
-          <a:prstGeom prst="rect">
-            <a:avLst/>
-          </a:prstGeom>
-          <a:noFill/>
-        </p:spPr>
-        <p:txBody>
-          <a:bodyPr wrap="none" rtlCol="0">
-            <a:spAutoFit/>
-          </a:bodyPr>
-          <a:lstStyle/>
-          <a:p>
-            <a:r>
-              <a:rPr lang="en-ES" sz="1400" dirty="0"/>
-              <a:t>Google Cloud</a:t>
-            </a:r>
-          </a:p>
-          <a:p>
-            <a:r>
-              <a:rPr lang="en-ES" sz="1400" dirty="0"/>
-              <a:t>Platform</a:t>
-            </a:r>
-          </a:p>
-        </p:txBody>
-      </p:sp>
-      <p:sp>
-        <p:nvSpPr>
-          <p:cNvPr id="38" name="TextBox 37">
-            <a:extLst>
-              <a:ext uri="{FF2B5EF4-FFF2-40B4-BE49-F238E27FC236}">
-                <a16:creationId xmlns:a16="http://schemas.microsoft.com/office/drawing/2014/main" id="{3DCAE82B-3F1D-3CBF-D311-A237CAB77CEF}"/>
-              </a:ext>
-            </a:extLst>
-          </p:cNvPr>
-          <p:cNvSpPr txBox="1"/>
-          <p:nvPr/>
-        </p:nvSpPr>
-        <p:spPr>
-          <a:xfrm>
-            <a:off x="4979907" y="5209667"/>
-            <a:ext cx="1893467" cy="553998"/>
-          </a:xfrm>
-          <a:prstGeom prst="rect">
-            <a:avLst/>
-          </a:prstGeom>
-          <a:noFill/>
-        </p:spPr>
-        <p:txBody>
-          <a:bodyPr wrap="none" rtlCol="0">
-            <a:spAutoFit/>
-          </a:bodyPr>
-          <a:lstStyle/>
-          <a:p>
-            <a:r>
-              <a:rPr lang="en-ES" sz="1600" i="1" dirty="0"/>
-              <a:t>Building Access DB</a:t>
-            </a:r>
-          </a:p>
-          <a:p>
-            <a:r>
-              <a:rPr lang="en-ES" sz="1400" dirty="0"/>
-              <a:t>[Firebase]</a:t>
-            </a:r>
-          </a:p>
-        </p:txBody>
-      </p:sp>
-      <p:pic>
-        <p:nvPicPr>
-          <p:cNvPr id="40" name="Picture 39" descr="A blue and black logo&#10;&#10;AI-generated content may be incorrect.">
-            <a:extLst>
-              <a:ext uri="{FF2B5EF4-FFF2-40B4-BE49-F238E27FC236}">
-                <a16:creationId xmlns:a16="http://schemas.microsoft.com/office/drawing/2014/main" id="{2FC3BE92-3039-113E-DFB5-1B2AE1336FEA}"/>
-              </a:ext>
-            </a:extLst>
-          </p:cNvPr>
-          <p:cNvPicPr>
-            <a:picLocks noChangeAspect="1"/>
-          </p:cNvPicPr>
-          <p:nvPr/>
-        </p:nvPicPr>
-        <p:blipFill>
-          <a:blip r:embed="rId10"/>
-          <a:stretch>
-            <a:fillRect/>
-          </a:stretch>
-        </p:blipFill>
-        <p:spPr>
-          <a:xfrm>
-            <a:off x="8639046" y="915942"/>
-            <a:ext cx="2713616" cy="1424648"/>
-          </a:xfrm>
-          <a:prstGeom prst="rect">
-            <a:avLst/>
-          </a:prstGeom>
-        </p:spPr>
-      </p:pic>
-      <p:sp>
-        <p:nvSpPr>
-          <p:cNvPr id="48" name="TextBox 47">
-            <a:extLst>
-              <a:ext uri="{FF2B5EF4-FFF2-40B4-BE49-F238E27FC236}">
-                <a16:creationId xmlns:a16="http://schemas.microsoft.com/office/drawing/2014/main" id="{19B00CBC-3EDC-BB48-36B3-A86A300A1620}"/>
-              </a:ext>
-            </a:extLst>
-          </p:cNvPr>
-          <p:cNvSpPr txBox="1"/>
-          <p:nvPr/>
-        </p:nvSpPr>
-        <p:spPr>
-          <a:xfrm>
-            <a:off x="2962314" y="1184002"/>
-            <a:ext cx="1847942" cy="307777"/>
-          </a:xfrm>
-          <a:prstGeom prst="rect">
-            <a:avLst/>
-          </a:prstGeom>
-          <a:noFill/>
-        </p:spPr>
-        <p:txBody>
-          <a:bodyPr wrap="none" rtlCol="0">
-            <a:spAutoFit/>
-          </a:bodyPr>
-          <a:lstStyle/>
-          <a:p>
-            <a:r>
-              <a:rPr lang="en-ES" sz="1400" dirty="0"/>
-              <a:t>Request Pairing Code</a:t>
-            </a:r>
-          </a:p>
-        </p:txBody>
-      </p:sp>
-      <p:sp>
-        <p:nvSpPr>
-          <p:cNvPr id="49" name="TextBox 48">
-            <a:extLst>
-              <a:ext uri="{FF2B5EF4-FFF2-40B4-BE49-F238E27FC236}">
-                <a16:creationId xmlns:a16="http://schemas.microsoft.com/office/drawing/2014/main" id="{EF2EE45B-235A-5187-86EF-10D006FE4186}"/>
-              </a:ext>
-            </a:extLst>
-          </p:cNvPr>
-          <p:cNvSpPr txBox="1"/>
-          <p:nvPr/>
-        </p:nvSpPr>
-        <p:spPr>
-          <a:xfrm>
-            <a:off x="5574381" y="2512738"/>
-            <a:ext cx="1607299" cy="307777"/>
-          </a:xfrm>
-          <a:prstGeom prst="rect">
-            <a:avLst/>
-          </a:prstGeom>
-          <a:noFill/>
-        </p:spPr>
-        <p:txBody>
-          <a:bodyPr wrap="none" rtlCol="0">
-            <a:spAutoFit/>
-          </a:bodyPr>
-          <a:lstStyle/>
-          <a:p>
-            <a:r>
-              <a:rPr lang="en-ES" sz="1400" dirty="0"/>
-              <a:t>Pair (Pairing Code)</a:t>
-            </a:r>
-          </a:p>
-        </p:txBody>
-      </p:sp>
-      <p:cxnSp>
-        <p:nvCxnSpPr>
-          <p:cNvPr id="50" name="Straight Arrow Connector 49">
-            <a:extLst>
-              <a:ext uri="{FF2B5EF4-FFF2-40B4-BE49-F238E27FC236}">
-                <a16:creationId xmlns:a16="http://schemas.microsoft.com/office/drawing/2014/main" id="{0E32074F-1A97-ECDD-025E-DCED4161B4D9}"/>
-              </a:ext>
-            </a:extLst>
-          </p:cNvPr>
-          <p:cNvCxnSpPr>
-            <a:cxnSpLocks/>
-          </p:cNvCxnSpPr>
-          <p:nvPr/>
-        </p:nvCxnSpPr>
-        <p:spPr>
-          <a:xfrm flipV="1">
-            <a:off x="5272602" y="2142503"/>
-            <a:ext cx="4665936" cy="1323707"/>
-          </a:xfrm>
-          <a:prstGeom prst="straightConnector1">
-            <a:avLst/>
-          </a:prstGeom>
-          <a:ln>
-            <a:solidFill>
-              <a:srgbClr val="0070C0"/>
-            </a:solidFill>
-            <a:prstDash val="sysDot"/>
-            <a:headEnd type="triangle"/>
-            <a:tailEnd type="none"/>
-          </a:ln>
-        </p:spPr>
-        <p:style>
-          <a:lnRef idx="2">
-            <a:schemeClr val="accent1"/>
-          </a:lnRef>
-          <a:fillRef idx="0">
-            <a:schemeClr val="accent1"/>
-          </a:fillRef>
-          <a:effectRef idx="1">
-            <a:schemeClr val="accent1"/>
-          </a:effectRef>
-          <a:fontRef idx="minor">
-            <a:schemeClr val="tx1"/>
-          </a:fontRef>
-        </p:style>
-      </p:cxnSp>
-      <p:sp>
-        <p:nvSpPr>
-          <p:cNvPr id="51" name="TextBox 50">
-            <a:extLst>
-              <a:ext uri="{FF2B5EF4-FFF2-40B4-BE49-F238E27FC236}">
-                <a16:creationId xmlns:a16="http://schemas.microsoft.com/office/drawing/2014/main" id="{DB9761F9-4500-CD9F-B97E-8BB3681C8CC0}"/>
-              </a:ext>
-            </a:extLst>
-          </p:cNvPr>
-          <p:cNvSpPr txBox="1"/>
-          <p:nvPr/>
-        </p:nvSpPr>
-        <p:spPr>
-          <a:xfrm>
-            <a:off x="6179607" y="3131078"/>
-            <a:ext cx="1043876" cy="307777"/>
-          </a:xfrm>
-          <a:prstGeom prst="rect">
-            <a:avLst/>
-          </a:prstGeom>
-          <a:noFill/>
-        </p:spPr>
-        <p:txBody>
-          <a:bodyPr wrap="none" rtlCol="0">
-            <a:spAutoFit/>
-          </a:bodyPr>
-          <a:lstStyle/>
-          <a:p>
-            <a:r>
-              <a:rPr lang="en-ES" sz="1400" dirty="0">
-                <a:solidFill>
-                  <a:srgbClr val="0070C0"/>
-                </a:solidFill>
-              </a:rPr>
-              <a:t>Account ID</a:t>
-            </a:r>
-          </a:p>
-        </p:txBody>
-      </p:sp>
-      <p:pic>
-        <p:nvPicPr>
-          <p:cNvPr id="53" name="Picture 52" descr="A blue and white logo&#10;&#10;AI-generated content may be incorrect.">
-            <a:extLst>
-              <a:ext uri="{FF2B5EF4-FFF2-40B4-BE49-F238E27FC236}">
-                <a16:creationId xmlns:a16="http://schemas.microsoft.com/office/drawing/2014/main" id="{20309199-A032-DE61-349D-B7E430FDA124}"/>
-              </a:ext>
-            </a:extLst>
-          </p:cNvPr>
-          <p:cNvPicPr>
-            <a:picLocks noChangeAspect="1"/>
-          </p:cNvPicPr>
-          <p:nvPr/>
-        </p:nvPicPr>
-        <p:blipFill>
-          <a:blip r:embed="rId11"/>
-          <a:stretch>
-            <a:fillRect/>
-          </a:stretch>
-        </p:blipFill>
-        <p:spPr>
-          <a:xfrm>
-            <a:off x="938413" y="1335878"/>
-            <a:ext cx="621325" cy="584776"/>
-          </a:xfrm>
-          <a:prstGeom prst="rect">
-            <a:avLst/>
-          </a:prstGeom>
-        </p:spPr>
-      </p:pic>
-      <p:cxnSp>
-        <p:nvCxnSpPr>
-          <p:cNvPr id="54" name="Straight Arrow Connector 53">
-            <a:extLst>
-              <a:ext uri="{FF2B5EF4-FFF2-40B4-BE49-F238E27FC236}">
-                <a16:creationId xmlns:a16="http://schemas.microsoft.com/office/drawing/2014/main" id="{FFEF7FFC-E298-9FBC-091F-9AFE480DBB9B}"/>
-              </a:ext>
-            </a:extLst>
-          </p:cNvPr>
-          <p:cNvCxnSpPr>
-            <a:cxnSpLocks/>
-          </p:cNvCxnSpPr>
-          <p:nvPr/>
-        </p:nvCxnSpPr>
-        <p:spPr>
-          <a:xfrm>
-            <a:off x="1571382" y="2182100"/>
-            <a:ext cx="2927831" cy="1056506"/>
-          </a:xfrm>
-          <a:prstGeom prst="straightConnector1">
-            <a:avLst/>
-          </a:prstGeom>
-          <a:ln>
-            <a:tailEnd type="triangle"/>
-          </a:ln>
-        </p:spPr>
-        <p:style>
-          <a:lnRef idx="2">
-            <a:schemeClr val="accent1"/>
-          </a:lnRef>
-          <a:fillRef idx="0">
-            <a:schemeClr val="accent1"/>
-          </a:fillRef>
-          <a:effectRef idx="1">
-            <a:schemeClr val="accent1"/>
-          </a:effectRef>
-          <a:fontRef idx="minor">
-            <a:schemeClr val="tx1"/>
-          </a:fontRef>
-        </p:style>
-      </p:cxnSp>
-      <p:cxnSp>
-        <p:nvCxnSpPr>
-          <p:cNvPr id="17" name="Straight Arrow Connector 16">
-            <a:extLst>
-              <a:ext uri="{FF2B5EF4-FFF2-40B4-BE49-F238E27FC236}">
-                <a16:creationId xmlns:a16="http://schemas.microsoft.com/office/drawing/2014/main" id="{727E8319-1148-10FC-0620-887D6F84597F}"/>
-              </a:ext>
-            </a:extLst>
-          </p:cNvPr>
-          <p:cNvCxnSpPr>
-            <a:cxnSpLocks/>
-          </p:cNvCxnSpPr>
-          <p:nvPr/>
-        </p:nvCxnSpPr>
-        <p:spPr>
-          <a:xfrm>
-            <a:off x="1648496" y="1486279"/>
-            <a:ext cx="7805388" cy="0"/>
-          </a:xfrm>
-          <a:prstGeom prst="straightConnector1">
-            <a:avLst/>
-          </a:prstGeom>
-          <a:ln>
-            <a:tailEnd type="triangle"/>
-          </a:ln>
-        </p:spPr>
-        <p:style>
-          <a:lnRef idx="2">
-            <a:schemeClr val="accent1"/>
-          </a:lnRef>
-          <a:fillRef idx="0">
-            <a:schemeClr val="accent1"/>
-          </a:fillRef>
-          <a:effectRef idx="1">
-            <a:schemeClr val="accent1"/>
-          </a:effectRef>
-          <a:fontRef idx="minor">
-            <a:schemeClr val="tx1"/>
-          </a:fontRef>
-        </p:style>
-      </p:cxnSp>
-      <p:cxnSp>
-        <p:nvCxnSpPr>
-          <p:cNvPr id="61" name="Straight Arrow Connector 60">
-            <a:extLst>
-              <a:ext uri="{FF2B5EF4-FFF2-40B4-BE49-F238E27FC236}">
-                <a16:creationId xmlns:a16="http://schemas.microsoft.com/office/drawing/2014/main" id="{14280EA4-4DEC-A85C-9B7F-5BB4658D9315}"/>
-              </a:ext>
-            </a:extLst>
-          </p:cNvPr>
-          <p:cNvCxnSpPr>
-            <a:cxnSpLocks/>
-          </p:cNvCxnSpPr>
-          <p:nvPr/>
-        </p:nvCxnSpPr>
-        <p:spPr>
-          <a:xfrm>
-            <a:off x="1608976" y="1662505"/>
-            <a:ext cx="7844908" cy="0"/>
-          </a:xfrm>
-          <a:prstGeom prst="straightConnector1">
-            <a:avLst/>
-          </a:prstGeom>
-          <a:ln>
-            <a:solidFill>
-              <a:srgbClr val="0070C0"/>
-            </a:solidFill>
-            <a:prstDash val="sysDot"/>
-            <a:headEnd type="triangle"/>
-            <a:tailEnd type="none"/>
-          </a:ln>
-        </p:spPr>
-        <p:style>
-          <a:lnRef idx="2">
-            <a:schemeClr val="accent1"/>
-          </a:lnRef>
-          <a:fillRef idx="0">
-            <a:schemeClr val="accent1"/>
-          </a:fillRef>
-          <a:effectRef idx="1">
-            <a:schemeClr val="accent1"/>
-          </a:effectRef>
-          <a:fontRef idx="minor">
-            <a:schemeClr val="tx1"/>
-          </a:fontRef>
-        </p:style>
-      </p:cxnSp>
-      <p:sp>
-        <p:nvSpPr>
-          <p:cNvPr id="63" name="TextBox 62">
-            <a:extLst>
-              <a:ext uri="{FF2B5EF4-FFF2-40B4-BE49-F238E27FC236}">
-                <a16:creationId xmlns:a16="http://schemas.microsoft.com/office/drawing/2014/main" id="{A0AEF8BD-FB81-5E2D-41F5-A42E93668186}"/>
-              </a:ext>
-            </a:extLst>
-          </p:cNvPr>
-          <p:cNvSpPr txBox="1"/>
-          <p:nvPr/>
-        </p:nvSpPr>
-        <p:spPr>
-          <a:xfrm>
-            <a:off x="2208796" y="2121863"/>
-            <a:ext cx="1607299" cy="307777"/>
-          </a:xfrm>
-          <a:prstGeom prst="rect">
-            <a:avLst/>
-          </a:prstGeom>
-          <a:noFill/>
-        </p:spPr>
-        <p:txBody>
-          <a:bodyPr wrap="none" rtlCol="0">
-            <a:spAutoFit/>
-          </a:bodyPr>
-          <a:lstStyle/>
-          <a:p>
-            <a:r>
-              <a:rPr lang="en-ES" sz="1400" dirty="0"/>
-              <a:t>Pair (Pairing Code)</a:t>
-            </a:r>
-          </a:p>
-        </p:txBody>
-      </p:sp>
-      <p:cxnSp>
-        <p:nvCxnSpPr>
-          <p:cNvPr id="66" name="Straight Arrow Connector 65">
-            <a:extLst>
-              <a:ext uri="{FF2B5EF4-FFF2-40B4-BE49-F238E27FC236}">
-                <a16:creationId xmlns:a16="http://schemas.microsoft.com/office/drawing/2014/main" id="{71DB3877-E862-992E-5715-912EDB364151}"/>
-              </a:ext>
-            </a:extLst>
-          </p:cNvPr>
-          <p:cNvCxnSpPr>
-            <a:cxnSpLocks/>
-          </p:cNvCxnSpPr>
-          <p:nvPr/>
-        </p:nvCxnSpPr>
-        <p:spPr>
-          <a:xfrm>
-            <a:off x="1564936" y="2344101"/>
-            <a:ext cx="2895017" cy="1082509"/>
-          </a:xfrm>
-          <a:prstGeom prst="straightConnector1">
-            <a:avLst/>
-          </a:prstGeom>
-          <a:ln>
-            <a:solidFill>
-              <a:srgbClr val="0070C0"/>
-            </a:solidFill>
-            <a:prstDash val="sysDot"/>
-            <a:headEnd type="triangle"/>
-            <a:tailEnd type="none"/>
-          </a:ln>
-        </p:spPr>
-        <p:style>
-          <a:lnRef idx="2">
-            <a:schemeClr val="accent1"/>
-          </a:lnRef>
-          <a:fillRef idx="0">
-            <a:schemeClr val="accent1"/>
-          </a:fillRef>
-          <a:effectRef idx="1">
-            <a:schemeClr val="accent1"/>
-          </a:effectRef>
-          <a:fontRef idx="minor">
-            <a:schemeClr val="tx1"/>
-          </a:fontRef>
-        </p:style>
-      </p:cxnSp>
-      <p:sp>
-        <p:nvSpPr>
-          <p:cNvPr id="70" name="TextBox 69">
-            <a:extLst>
-              <a:ext uri="{FF2B5EF4-FFF2-40B4-BE49-F238E27FC236}">
-                <a16:creationId xmlns:a16="http://schemas.microsoft.com/office/drawing/2014/main" id="{959407F1-52F4-EE61-224D-F97E668EA8A1}"/>
-              </a:ext>
-            </a:extLst>
-          </p:cNvPr>
-          <p:cNvSpPr txBox="1"/>
-          <p:nvPr/>
-        </p:nvSpPr>
-        <p:spPr>
-          <a:xfrm>
-            <a:off x="2594484" y="3046717"/>
-            <a:ext cx="1043876" cy="307777"/>
-          </a:xfrm>
-          <a:prstGeom prst="rect">
-            <a:avLst/>
-          </a:prstGeom>
-          <a:noFill/>
-        </p:spPr>
-        <p:txBody>
-          <a:bodyPr wrap="none" rtlCol="0">
-            <a:spAutoFit/>
-          </a:bodyPr>
-          <a:lstStyle/>
-          <a:p>
-            <a:r>
-              <a:rPr lang="en-ES" sz="1400" dirty="0">
-                <a:solidFill>
-                  <a:srgbClr val="0070C0"/>
-                </a:solidFill>
-              </a:rPr>
-              <a:t>Account ID</a:t>
-            </a:r>
-          </a:p>
-        </p:txBody>
-      </p:sp>
-      <p:cxnSp>
-        <p:nvCxnSpPr>
-          <p:cNvPr id="11" name="Straight Arrow Connector 10">
-            <a:extLst>
-              <a:ext uri="{FF2B5EF4-FFF2-40B4-BE49-F238E27FC236}">
-                <a16:creationId xmlns:a16="http://schemas.microsoft.com/office/drawing/2014/main" id="{309C5DFA-DF71-ABDF-A212-9C7D47190773}"/>
-              </a:ext>
-            </a:extLst>
-          </p:cNvPr>
-          <p:cNvCxnSpPr>
-            <a:cxnSpLocks/>
-          </p:cNvCxnSpPr>
-          <p:nvPr/>
-        </p:nvCxnSpPr>
-        <p:spPr>
-          <a:xfrm flipV="1">
-            <a:off x="5269163" y="2080746"/>
-            <a:ext cx="4261826" cy="1212565"/>
-          </a:xfrm>
-          <a:prstGeom prst="straightConnector1">
-            <a:avLst/>
-          </a:prstGeom>
-          <a:ln>
-            <a:tailEnd type="triangle"/>
-          </a:ln>
-        </p:spPr>
-        <p:style>
-          <a:lnRef idx="2">
-            <a:schemeClr val="accent1"/>
-          </a:lnRef>
-          <a:fillRef idx="0">
-            <a:schemeClr val="accent1"/>
-          </a:fillRef>
-          <a:effectRef idx="1">
-            <a:schemeClr val="accent1"/>
-          </a:effectRef>
-          <a:fontRef idx="minor">
-            <a:schemeClr val="tx1"/>
-          </a:fontRef>
-        </p:style>
-      </p:cxnSp>
-      <p:sp>
-        <p:nvSpPr>
-          <p:cNvPr id="78" name="TextBox 77">
-            <a:extLst>
-              <a:ext uri="{FF2B5EF4-FFF2-40B4-BE49-F238E27FC236}">
-                <a16:creationId xmlns:a16="http://schemas.microsoft.com/office/drawing/2014/main" id="{74FE005F-1550-5393-9606-7570EE0E9864}"/>
-              </a:ext>
-            </a:extLst>
-          </p:cNvPr>
-          <p:cNvSpPr txBox="1"/>
-          <p:nvPr/>
-        </p:nvSpPr>
-        <p:spPr>
-          <a:xfrm>
-            <a:off x="2208796" y="4263288"/>
-            <a:ext cx="1331711" cy="523220"/>
-          </a:xfrm>
-          <a:prstGeom prst="rect">
-            <a:avLst/>
-          </a:prstGeom>
-          <a:noFill/>
-        </p:spPr>
-        <p:txBody>
-          <a:bodyPr wrap="none" rtlCol="0">
-            <a:spAutoFit/>
-          </a:bodyPr>
-          <a:lstStyle/>
-          <a:p>
-            <a:r>
-              <a:rPr lang="en-ES" sz="1400" dirty="0"/>
-              <a:t>Account ID +</a:t>
-            </a:r>
-          </a:p>
-          <a:p>
-            <a:r>
-              <a:rPr lang="en-ES" sz="1400" dirty="0"/>
-              <a:t>Access Details</a:t>
-            </a:r>
-          </a:p>
-        </p:txBody>
-      </p:sp>
-      <p:sp>
-        <p:nvSpPr>
-          <p:cNvPr id="85" name="TextBox 84">
-            <a:extLst>
-              <a:ext uri="{FF2B5EF4-FFF2-40B4-BE49-F238E27FC236}">
-                <a16:creationId xmlns:a16="http://schemas.microsoft.com/office/drawing/2014/main" id="{5AF9F3DD-1538-605F-1CCE-EB9CFAA76A69}"/>
-              </a:ext>
-            </a:extLst>
-          </p:cNvPr>
-          <p:cNvSpPr txBox="1"/>
-          <p:nvPr/>
-        </p:nvSpPr>
-        <p:spPr>
-          <a:xfrm>
-            <a:off x="3094044" y="1640035"/>
-            <a:ext cx="6097656" cy="307777"/>
-          </a:xfrm>
-          <a:prstGeom prst="rect">
-            <a:avLst/>
-          </a:prstGeom>
-          <a:noFill/>
-        </p:spPr>
-        <p:txBody>
-          <a:bodyPr wrap="square">
-            <a:spAutoFit/>
-          </a:bodyPr>
-          <a:lstStyle/>
-          <a:p>
-            <a:r>
-              <a:rPr lang="en-ES" sz="1400" dirty="0">
-                <a:solidFill>
-                  <a:srgbClr val="0070C0"/>
-                </a:solidFill>
-              </a:rPr>
-              <a:t>Pairing Code</a:t>
-            </a:r>
-          </a:p>
-        </p:txBody>
-      </p:sp>
-      <p:sp>
-        <p:nvSpPr>
-          <p:cNvPr id="87" name="Title 1">
-            <a:extLst>
-              <a:ext uri="{FF2B5EF4-FFF2-40B4-BE49-F238E27FC236}">
-                <a16:creationId xmlns:a16="http://schemas.microsoft.com/office/drawing/2014/main" id="{7060A800-91BD-C2D0-AC63-8ADB782CAA43}"/>
-              </a:ext>
-            </a:extLst>
-          </p:cNvPr>
-          <p:cNvSpPr txBox="1">
-            <a:spLocks/>
-          </p:cNvSpPr>
-          <p:nvPr/>
-        </p:nvSpPr>
-        <p:spPr>
-          <a:xfrm>
-            <a:off x="668840" y="126528"/>
-            <a:ext cx="10515600" cy="760409"/>
-          </a:xfrm>
-          <a:prstGeom prst="rect">
-            <a:avLst/>
-          </a:prstGeom>
-        </p:spPr>
-        <p:txBody>
-          <a:bodyPr vert="horz" lIns="91440" tIns="45720" rIns="91440" bIns="45720" rtlCol="0" anchor="b">
-            <a:normAutofit fontScale="92500" lnSpcReduction="20000"/>
-          </a:bodyPr>
-          <a:lstStyle>
-            <a:lvl1pPr algn="ctr" defTabSz="914400" rtl="0" eaLnBrk="1" latinLnBrk="0" hangingPunct="1">
-              <a:lnSpc>
-                <a:spcPct val="90000"/>
-              </a:lnSpc>
-              <a:spcBef>
-                <a:spcPct val="0"/>
-              </a:spcBef>
-              <a:buNone/>
-              <a:defRPr sz="6000" kern="1200">
-                <a:solidFill>
-                  <a:schemeClr val="tx1"/>
-                </a:solidFill>
-                <a:latin typeface="+mj-lt"/>
-                <a:ea typeface="+mj-ea"/>
-                <a:cs typeface="+mj-cs"/>
-              </a:defRPr>
-            </a:lvl1pPr>
-          </a:lstStyle>
+      <p:sp>
+        <p:nvSpPr>
+          <p:cNvPr id="2" name="Title 1">
+            <a:extLst>
+              <a:ext uri="{FF2B5EF4-FFF2-40B4-BE49-F238E27FC236}">
+                <a16:creationId xmlns:a16="http://schemas.microsoft.com/office/drawing/2014/main" id="{C6099277-EC66-53C4-7CF2-0D21C26AF865}"/>
+              </a:ext>
+            </a:extLst>
+          </p:cNvPr>
+          <p:cNvSpPr>
+            <a:spLocks noGrp="1"/>
+          </p:cNvSpPr>
+          <p:nvPr>
+            <p:ph type="ctrTitle"/>
+          </p:nvPr>
+        </p:nvSpPr>
+        <p:spPr/>
+        <p:txBody>
+          <a:bodyPr/>
+          <a:lstStyle/>
           <a:p>
             <a:r>
               <a:rPr lang="en-ES" b="1" dirty="0">
@@ -4543,13 +3379,59 @@
               </a:rPr>
               <a:t>Latch tu Flutter</a:t>
             </a:r>
+            <a:endParaRPr lang="en-ES" dirty="0"/>
+          </a:p>
+        </p:txBody>
+      </p:sp>
+      <p:sp>
+        <p:nvSpPr>
+          <p:cNvPr id="3" name="Subtitle 2">
+            <a:extLst>
+              <a:ext uri="{FF2B5EF4-FFF2-40B4-BE49-F238E27FC236}">
+                <a16:creationId xmlns:a16="http://schemas.microsoft.com/office/drawing/2014/main" id="{84708AC2-8110-160C-C530-1F65023E5CF7}"/>
+              </a:ext>
+            </a:extLst>
+          </p:cNvPr>
+          <p:cNvSpPr>
+            <a:spLocks noGrp="1"/>
+          </p:cNvSpPr>
+          <p:nvPr>
+            <p:ph type="subTitle" idx="1"/>
+          </p:nvPr>
+        </p:nvSpPr>
+        <p:spPr/>
+        <p:txBody>
+          <a:bodyPr/>
+          <a:lstStyle/>
+          <a:p>
+            <a:r>
+              <a:rPr lang="en-GB" dirty="0"/>
+              <a:t>Hack Your Innovation Contest</a:t>
+            </a:r>
+          </a:p>
+          <a:p>
+            <a:r>
+              <a:rPr lang="en-GB" dirty="0"/>
+              <a:t>March 2025</a:t>
+            </a:r>
+          </a:p>
+          <a:p>
+            <a:r>
+              <a:rPr lang="en-GB" i="1" dirty="0"/>
+              <a:t>Hacked by </a:t>
+            </a:r>
+            <a:r>
+              <a:rPr lang="en-GB" dirty="0"/>
+              <a:t>Pietro Romano</a:t>
+            </a:r>
+            <a:endParaRPr lang="en-ES" dirty="0"/>
           </a:p>
         </p:txBody>
       </p:sp>
     </p:spTree>
     <p:extLst>
       <p:ext uri="{BB962C8B-B14F-4D97-AF65-F5344CB8AC3E}">
-        <p14:creationId xmlns:p14="http://schemas.microsoft.com/office/powerpoint/2010/main" val="1896908938"/>
+        <p14:creationId xmlns:p14="http://schemas.microsoft.com/office/powerpoint/2010/main" val="440276294"/>
       </p:ext>
     </p:extLst>
   </p:cSld>
@@ -4576,63 +3458,2025 @@
           <a:chExt cx="0" cy="0"/>
         </a:xfrm>
       </p:grpSpPr>
-      <p:sp>
-        <p:nvSpPr>
-          <p:cNvPr id="2" name="Title 1">
-            <a:extLst>
-              <a:ext uri="{FF2B5EF4-FFF2-40B4-BE49-F238E27FC236}">
-                <a16:creationId xmlns:a16="http://schemas.microsoft.com/office/drawing/2014/main" id="{62BEF722-D94F-CEDE-B037-45AFC5138C29}"/>
-              </a:ext>
-            </a:extLst>
-          </p:cNvPr>
-          <p:cNvSpPr>
-            <a:spLocks noGrp="1"/>
-          </p:cNvSpPr>
-          <p:nvPr>
-            <p:ph type="title"/>
-          </p:nvPr>
-        </p:nvSpPr>
-        <p:spPr/>
-        <p:txBody>
-          <a:bodyPr/>
-          <a:lstStyle/>
-          <a:p>
-            <a:r>
-              <a:rPr lang="en-ES" dirty="0"/>
-              <a:t>Latch TU Flutter</a:t>
-            </a:r>
-          </a:p>
-        </p:txBody>
-      </p:sp>
-      <p:sp>
-        <p:nvSpPr>
-          <p:cNvPr id="3" name="Content Placeholder 2">
-            <a:extLst>
-              <a:ext uri="{FF2B5EF4-FFF2-40B4-BE49-F238E27FC236}">
-                <a16:creationId xmlns:a16="http://schemas.microsoft.com/office/drawing/2014/main" id="{1014FEEC-0BA6-93B8-B11D-EED015FDD1B3}"/>
-              </a:ext>
-            </a:extLst>
-          </p:cNvPr>
-          <p:cNvSpPr>
-            <a:spLocks noGrp="1"/>
-          </p:cNvSpPr>
-          <p:nvPr>
-            <p:ph idx="1"/>
-          </p:nvPr>
-        </p:nvSpPr>
-        <p:spPr/>
-        <p:txBody>
-          <a:bodyPr/>
-          <a:lstStyle/>
-          <a:p>
-            <a:endParaRPr lang="en-ES"/>
+      <p:pic>
+        <p:nvPicPr>
+          <p:cNvPr id="37" name="Picture 36" descr="A black background with a black square&#10;&#10;AI-generated content may be incorrect.">
+            <a:extLst>
+              <a:ext uri="{FF2B5EF4-FFF2-40B4-BE49-F238E27FC236}">
+                <a16:creationId xmlns:a16="http://schemas.microsoft.com/office/drawing/2014/main" id="{18A30B91-06AF-8B0C-A96B-4D92DA55D754}"/>
+              </a:ext>
+            </a:extLst>
+          </p:cNvPr>
+          <p:cNvPicPr>
+            <a:picLocks noChangeAspect="1"/>
+          </p:cNvPicPr>
+          <p:nvPr/>
+        </p:nvPicPr>
+        <p:blipFill>
+          <a:blip r:embed="rId2"/>
+          <a:stretch>
+            <a:fillRect/>
+          </a:stretch>
+        </p:blipFill>
+        <p:spPr>
+          <a:xfrm>
+            <a:off x="320331" y="990961"/>
+            <a:ext cx="1866604" cy="2139043"/>
+          </a:xfrm>
+          <a:prstGeom prst="rect">
+            <a:avLst/>
+          </a:prstGeom>
+        </p:spPr>
+      </p:pic>
+      <p:sp>
+        <p:nvSpPr>
+          <p:cNvPr id="24" name="Rounded Rectangle 23">
+            <a:extLst>
+              <a:ext uri="{FF2B5EF4-FFF2-40B4-BE49-F238E27FC236}">
+                <a16:creationId xmlns:a16="http://schemas.microsoft.com/office/drawing/2014/main" id="{C2D5360E-C0A9-B6C5-2679-42B425C74D66}"/>
+              </a:ext>
+            </a:extLst>
+          </p:cNvPr>
+          <p:cNvSpPr/>
+          <p:nvPr/>
+        </p:nvSpPr>
+        <p:spPr>
+          <a:xfrm>
+            <a:off x="4130006" y="2628724"/>
+            <a:ext cx="3973688" cy="1758113"/>
+          </a:xfrm>
+          <a:prstGeom prst="roundRect">
+            <a:avLst/>
+          </a:prstGeom>
+          <a:solidFill>
+            <a:schemeClr val="tx2">
+              <a:lumMod val="10000"/>
+              <a:lumOff val="90000"/>
+            </a:schemeClr>
+          </a:solidFill>
+          <a:ln>
+            <a:noFill/>
+          </a:ln>
+        </p:spPr>
+        <p:style>
+          <a:lnRef idx="2">
+            <a:schemeClr val="accent1">
+              <a:shade val="15000"/>
+            </a:schemeClr>
+          </a:lnRef>
+          <a:fillRef idx="1">
+            <a:schemeClr val="accent1"/>
+          </a:fillRef>
+          <a:effectRef idx="0">
+            <a:schemeClr val="accent1"/>
+          </a:effectRef>
+          <a:fontRef idx="minor">
+            <a:schemeClr val="lt1"/>
+          </a:fontRef>
+        </p:style>
+        <p:txBody>
+          <a:bodyPr rtlCol="0" anchor="ctr"/>
+          <a:lstStyle/>
+          <a:p>
+            <a:pPr algn="ctr"/>
+            <a:endParaRPr lang="en-ES"/>
+          </a:p>
+        </p:txBody>
+      </p:sp>
+      <p:sp>
+        <p:nvSpPr>
+          <p:cNvPr id="44" name="Rounded Rectangle 43">
+            <a:extLst>
+              <a:ext uri="{FF2B5EF4-FFF2-40B4-BE49-F238E27FC236}">
+                <a16:creationId xmlns:a16="http://schemas.microsoft.com/office/drawing/2014/main" id="{57AE673A-5008-DF8B-860A-EB9CC2FD438E}"/>
+              </a:ext>
+            </a:extLst>
+          </p:cNvPr>
+          <p:cNvSpPr/>
+          <p:nvPr/>
+        </p:nvSpPr>
+        <p:spPr>
+          <a:xfrm>
+            <a:off x="4140327" y="4764080"/>
+            <a:ext cx="3973688" cy="1745028"/>
+          </a:xfrm>
+          <a:prstGeom prst="roundRect">
+            <a:avLst/>
+          </a:prstGeom>
+          <a:solidFill>
+            <a:schemeClr val="tx2">
+              <a:lumMod val="10000"/>
+              <a:lumOff val="90000"/>
+            </a:schemeClr>
+          </a:solidFill>
+          <a:ln>
+            <a:noFill/>
+          </a:ln>
+        </p:spPr>
+        <p:style>
+          <a:lnRef idx="2">
+            <a:schemeClr val="accent1">
+              <a:shade val="15000"/>
+            </a:schemeClr>
+          </a:lnRef>
+          <a:fillRef idx="1">
+            <a:schemeClr val="accent1"/>
+          </a:fillRef>
+          <a:effectRef idx="0">
+            <a:schemeClr val="accent1"/>
+          </a:effectRef>
+          <a:fontRef idx="minor">
+            <a:schemeClr val="lt1"/>
+          </a:fontRef>
+        </p:style>
+        <p:txBody>
+          <a:bodyPr rtlCol="0" anchor="ctr"/>
+          <a:lstStyle/>
+          <a:p>
+            <a:pPr algn="ctr"/>
+            <a:endParaRPr lang="en-ES"/>
+          </a:p>
+        </p:txBody>
+      </p:sp>
+      <p:pic>
+        <p:nvPicPr>
+          <p:cNvPr id="5" name="Graphic 4">
+            <a:extLst>
+              <a:ext uri="{FF2B5EF4-FFF2-40B4-BE49-F238E27FC236}">
+                <a16:creationId xmlns:a16="http://schemas.microsoft.com/office/drawing/2014/main" id="{70E26226-035B-198A-002D-E66C0C3169D8}"/>
+              </a:ext>
+            </a:extLst>
+          </p:cNvPr>
+          <p:cNvPicPr>
+            <a:picLocks noChangeAspect="1"/>
+          </p:cNvPicPr>
+          <p:nvPr/>
+        </p:nvPicPr>
+        <p:blipFill>
+          <a:blip r:embed="rId3">
+            <a:extLst>
+              <a:ext uri="{96DAC541-7B7A-43D3-8B79-37D633B846F1}">
+                <asvg:svgBlip xmlns:asvg="http://schemas.microsoft.com/office/drawing/2016/SVG/main" r:embed="rId4"/>
+              </a:ext>
+            </a:extLst>
+          </a:blip>
+          <a:stretch>
+            <a:fillRect/>
+          </a:stretch>
+        </p:blipFill>
+        <p:spPr>
+          <a:xfrm>
+            <a:off x="4524584" y="2956259"/>
+            <a:ext cx="601292" cy="601292"/>
+          </a:xfrm>
+          <a:prstGeom prst="rect">
+            <a:avLst/>
+          </a:prstGeom>
+        </p:spPr>
+      </p:pic>
+      <p:pic>
+        <p:nvPicPr>
+          <p:cNvPr id="7" name="Picture 6">
+            <a:extLst>
+              <a:ext uri="{FF2B5EF4-FFF2-40B4-BE49-F238E27FC236}">
+                <a16:creationId xmlns:a16="http://schemas.microsoft.com/office/drawing/2014/main" id="{B93BF93B-0109-AF3B-3B8C-5261E5C4A94B}"/>
+              </a:ext>
+            </a:extLst>
+          </p:cNvPr>
+          <p:cNvPicPr>
+            <a:picLocks noChangeAspect="1"/>
+          </p:cNvPicPr>
+          <p:nvPr/>
+        </p:nvPicPr>
+        <p:blipFill>
+          <a:blip r:embed="rId5"/>
+          <a:stretch>
+            <a:fillRect/>
+          </a:stretch>
+        </p:blipFill>
+        <p:spPr>
+          <a:xfrm>
+            <a:off x="7695562" y="3812327"/>
+            <a:ext cx="600562" cy="600562"/>
+          </a:xfrm>
+          <a:prstGeom prst="rect">
+            <a:avLst/>
+          </a:prstGeom>
+        </p:spPr>
+      </p:pic>
+      <p:sp>
+        <p:nvSpPr>
+          <p:cNvPr id="12" name="TextBox 11">
+            <a:extLst>
+              <a:ext uri="{FF2B5EF4-FFF2-40B4-BE49-F238E27FC236}">
+                <a16:creationId xmlns:a16="http://schemas.microsoft.com/office/drawing/2014/main" id="{8C3644C6-46DD-1D2A-7004-C7C5044EE00C}"/>
+              </a:ext>
+            </a:extLst>
+          </p:cNvPr>
+          <p:cNvSpPr txBox="1"/>
+          <p:nvPr/>
+        </p:nvSpPr>
+        <p:spPr>
+          <a:xfrm>
+            <a:off x="4441618" y="3654056"/>
+            <a:ext cx="2468625" cy="553998"/>
+          </a:xfrm>
+          <a:prstGeom prst="rect">
+            <a:avLst/>
+          </a:prstGeom>
+          <a:noFill/>
+        </p:spPr>
+        <p:txBody>
+          <a:bodyPr wrap="none" rtlCol="0">
+            <a:spAutoFit/>
+          </a:bodyPr>
+          <a:lstStyle/>
+          <a:p>
+            <a:r>
+              <a:rPr lang="en-ES" sz="1600" i="1" dirty="0"/>
+              <a:t>latch_tu_flutter_api</a:t>
+            </a:r>
+          </a:p>
+          <a:p>
+            <a:r>
+              <a:rPr lang="en-ES" sz="1400" dirty="0"/>
+              <a:t>[App Service / Linux /  Python]</a:t>
+            </a:r>
+          </a:p>
+        </p:txBody>
+      </p:sp>
+      <p:sp>
+        <p:nvSpPr>
+          <p:cNvPr id="13" name="TextBox 12">
+            <a:extLst>
+              <a:ext uri="{FF2B5EF4-FFF2-40B4-BE49-F238E27FC236}">
+                <a16:creationId xmlns:a16="http://schemas.microsoft.com/office/drawing/2014/main" id="{E5EF0589-64A0-19CB-AD08-0777390BA4A7}"/>
+              </a:ext>
+            </a:extLst>
+          </p:cNvPr>
+          <p:cNvSpPr txBox="1"/>
+          <p:nvPr/>
+        </p:nvSpPr>
+        <p:spPr>
+          <a:xfrm>
+            <a:off x="8260928" y="3856902"/>
+            <a:ext cx="955903" cy="523220"/>
+          </a:xfrm>
+          <a:prstGeom prst="rect">
+            <a:avLst/>
+          </a:prstGeom>
+          <a:noFill/>
+        </p:spPr>
+        <p:txBody>
+          <a:bodyPr wrap="none" rtlCol="0">
+            <a:spAutoFit/>
+          </a:bodyPr>
+          <a:lstStyle/>
+          <a:p>
+            <a:r>
+              <a:rPr lang="en-ES" sz="1400" dirty="0"/>
+              <a:t>Microsoft </a:t>
+            </a:r>
+          </a:p>
+          <a:p>
+            <a:r>
+              <a:rPr lang="en-ES" sz="1400" dirty="0"/>
+              <a:t>Azure </a:t>
+            </a:r>
+          </a:p>
+        </p:txBody>
+      </p:sp>
+      <p:pic>
+        <p:nvPicPr>
+          <p:cNvPr id="15" name="Picture 14" descr="A blue and black logo&#10;&#10;AI-generated content may be incorrect.">
+            <a:extLst>
+              <a:ext uri="{FF2B5EF4-FFF2-40B4-BE49-F238E27FC236}">
+                <a16:creationId xmlns:a16="http://schemas.microsoft.com/office/drawing/2014/main" id="{E703145E-5878-4929-FB84-0B5A6E29DBC9}"/>
+              </a:ext>
+            </a:extLst>
+          </p:cNvPr>
+          <p:cNvPicPr>
+            <a:picLocks noChangeAspect="1"/>
+          </p:cNvPicPr>
+          <p:nvPr/>
+        </p:nvPicPr>
+        <p:blipFill>
+          <a:blip r:embed="rId6"/>
+          <a:stretch>
+            <a:fillRect/>
+          </a:stretch>
+        </p:blipFill>
+        <p:spPr>
+          <a:xfrm>
+            <a:off x="926537" y="1997090"/>
+            <a:ext cx="613298" cy="584776"/>
+          </a:xfrm>
+          <a:prstGeom prst="rect">
+            <a:avLst/>
+          </a:prstGeom>
+        </p:spPr>
+      </p:pic>
+      <p:sp>
+        <p:nvSpPr>
+          <p:cNvPr id="16" name="TextBox 15">
+            <a:extLst>
+              <a:ext uri="{FF2B5EF4-FFF2-40B4-BE49-F238E27FC236}">
+                <a16:creationId xmlns:a16="http://schemas.microsoft.com/office/drawing/2014/main" id="{9DE035F7-630F-2CEF-F5CD-DB8D892B1BD7}"/>
+              </a:ext>
+            </a:extLst>
+          </p:cNvPr>
+          <p:cNvSpPr txBox="1"/>
+          <p:nvPr/>
+        </p:nvSpPr>
+        <p:spPr>
+          <a:xfrm>
+            <a:off x="297828" y="3145578"/>
+            <a:ext cx="1962332" cy="553998"/>
+          </a:xfrm>
+          <a:prstGeom prst="rect">
+            <a:avLst/>
+          </a:prstGeom>
+          <a:noFill/>
+        </p:spPr>
+        <p:txBody>
+          <a:bodyPr wrap="none" rtlCol="0">
+            <a:spAutoFit/>
+          </a:bodyPr>
+          <a:lstStyle/>
+          <a:p>
+            <a:r>
+              <a:rPr lang="en-ES" sz="1600" i="1" dirty="0"/>
+              <a:t>latch_tu_flutter_app</a:t>
+            </a:r>
+            <a:endParaRPr lang="en-ES" sz="1600" dirty="0"/>
+          </a:p>
+          <a:p>
+            <a:r>
+              <a:rPr lang="en-ES" sz="1400" dirty="0"/>
+              <a:t>[Flutter / iOS / Android]</a:t>
+            </a:r>
+          </a:p>
+        </p:txBody>
+      </p:sp>
+      <p:pic>
+        <p:nvPicPr>
+          <p:cNvPr id="21" name="Picture 20" descr="A red and yellow drop of water&#10;&#10;AI-generated content may be incorrect.">
+            <a:extLst>
+              <a:ext uri="{FF2B5EF4-FFF2-40B4-BE49-F238E27FC236}">
+                <a16:creationId xmlns:a16="http://schemas.microsoft.com/office/drawing/2014/main" id="{68BE15F8-C93A-5614-49EF-7E4D75951D6B}"/>
+              </a:ext>
+            </a:extLst>
+          </p:cNvPr>
+          <p:cNvPicPr>
+            <a:picLocks noChangeAspect="1"/>
+          </p:cNvPicPr>
+          <p:nvPr/>
+        </p:nvPicPr>
+        <p:blipFill>
+          <a:blip r:embed="rId7">
+            <a:extLst>
+              <a:ext uri="{BEBA8EAE-BF5A-486C-A8C5-ECC9F3942E4B}">
+                <a14:imgProps xmlns:a14="http://schemas.microsoft.com/office/drawing/2010/main">
+                  <a14:imgLayer r:embed="rId8">
+                    <a14:imgEffect>
+                      <a14:backgroundRemoval t="10000" b="90000" l="10000" r="90000"/>
+                    </a14:imgEffect>
+                  </a14:imgLayer>
+                </a14:imgProps>
+              </a:ext>
+            </a:extLst>
+          </a:blip>
+          <a:stretch>
+            <a:fillRect/>
+          </a:stretch>
+        </p:blipFill>
+        <p:spPr>
+          <a:xfrm>
+            <a:off x="4304394" y="4913931"/>
+            <a:ext cx="849734" cy="849734"/>
+          </a:xfrm>
+          <a:prstGeom prst="rect">
+            <a:avLst/>
+          </a:prstGeom>
+        </p:spPr>
+      </p:pic>
+      <p:pic>
+        <p:nvPicPr>
+          <p:cNvPr id="23" name="Picture 22" descr="A rainbow colored circle with a cloud in the center&#10;&#10;AI-generated content may be incorrect.">
+            <a:extLst>
+              <a:ext uri="{FF2B5EF4-FFF2-40B4-BE49-F238E27FC236}">
+                <a16:creationId xmlns:a16="http://schemas.microsoft.com/office/drawing/2014/main" id="{CF1FCABF-766A-405B-8CDB-0EBD54BD8AF2}"/>
+              </a:ext>
+            </a:extLst>
+          </p:cNvPr>
+          <p:cNvPicPr>
+            <a:picLocks noChangeAspect="1"/>
+          </p:cNvPicPr>
+          <p:nvPr/>
+        </p:nvPicPr>
+        <p:blipFill>
+          <a:blip r:embed="rId9"/>
+          <a:stretch>
+            <a:fillRect/>
+          </a:stretch>
+        </p:blipFill>
+        <p:spPr>
+          <a:xfrm>
+            <a:off x="7618179" y="5943050"/>
+            <a:ext cx="712041" cy="572275"/>
+          </a:xfrm>
+          <a:prstGeom prst="rect">
+            <a:avLst/>
+          </a:prstGeom>
+        </p:spPr>
+      </p:pic>
+      <p:cxnSp>
+        <p:nvCxnSpPr>
+          <p:cNvPr id="25" name="Straight Arrow Connector 24">
+            <a:extLst>
+              <a:ext uri="{FF2B5EF4-FFF2-40B4-BE49-F238E27FC236}">
+                <a16:creationId xmlns:a16="http://schemas.microsoft.com/office/drawing/2014/main" id="{941FF940-0AC4-621F-1A1A-FB8A8F5ACBEA}"/>
+              </a:ext>
+            </a:extLst>
+          </p:cNvPr>
+          <p:cNvCxnSpPr>
+            <a:cxnSpLocks/>
+          </p:cNvCxnSpPr>
+          <p:nvPr/>
+        </p:nvCxnSpPr>
+        <p:spPr>
+          <a:xfrm>
+            <a:off x="1340713" y="2591641"/>
+            <a:ext cx="3126953" cy="2541335"/>
+          </a:xfrm>
+          <a:prstGeom prst="straightConnector1">
+            <a:avLst/>
+          </a:prstGeom>
+          <a:ln>
+            <a:tailEnd type="triangle"/>
+          </a:ln>
+        </p:spPr>
+        <p:style>
+          <a:lnRef idx="2">
+            <a:schemeClr val="accent1"/>
+          </a:lnRef>
+          <a:fillRef idx="0">
+            <a:schemeClr val="accent1"/>
+          </a:fillRef>
+          <a:effectRef idx="1">
+            <a:schemeClr val="accent1"/>
+          </a:effectRef>
+          <a:fontRef idx="minor">
+            <a:schemeClr val="tx1"/>
+          </a:fontRef>
+        </p:style>
+      </p:cxnSp>
+      <p:sp>
+        <p:nvSpPr>
+          <p:cNvPr id="33" name="TextBox 32">
+            <a:extLst>
+              <a:ext uri="{FF2B5EF4-FFF2-40B4-BE49-F238E27FC236}">
+                <a16:creationId xmlns:a16="http://schemas.microsoft.com/office/drawing/2014/main" id="{6DF5178F-1C0A-CA63-2D83-76D13F08D70F}"/>
+              </a:ext>
+            </a:extLst>
+          </p:cNvPr>
+          <p:cNvSpPr txBox="1"/>
+          <p:nvPr/>
+        </p:nvSpPr>
+        <p:spPr>
+          <a:xfrm>
+            <a:off x="8263824" y="5842501"/>
+            <a:ext cx="1247457" cy="523220"/>
+          </a:xfrm>
+          <a:prstGeom prst="rect">
+            <a:avLst/>
+          </a:prstGeom>
+          <a:noFill/>
+        </p:spPr>
+        <p:txBody>
+          <a:bodyPr wrap="none" rtlCol="0">
+            <a:spAutoFit/>
+          </a:bodyPr>
+          <a:lstStyle/>
+          <a:p>
+            <a:r>
+              <a:rPr lang="en-ES" sz="1400" dirty="0"/>
+              <a:t>Google Cloud</a:t>
+            </a:r>
+          </a:p>
+          <a:p>
+            <a:r>
+              <a:rPr lang="en-ES" sz="1400" dirty="0"/>
+              <a:t>Platform</a:t>
+            </a:r>
+          </a:p>
+        </p:txBody>
+      </p:sp>
+      <p:sp>
+        <p:nvSpPr>
+          <p:cNvPr id="38" name="TextBox 37">
+            <a:extLst>
+              <a:ext uri="{FF2B5EF4-FFF2-40B4-BE49-F238E27FC236}">
+                <a16:creationId xmlns:a16="http://schemas.microsoft.com/office/drawing/2014/main" id="{3DCAE82B-3F1D-3CBF-D311-A237CAB77CEF}"/>
+              </a:ext>
+            </a:extLst>
+          </p:cNvPr>
+          <p:cNvSpPr txBox="1"/>
+          <p:nvPr/>
+        </p:nvSpPr>
+        <p:spPr>
+          <a:xfrm>
+            <a:off x="4979907" y="5209667"/>
+            <a:ext cx="1893467" cy="553998"/>
+          </a:xfrm>
+          <a:prstGeom prst="rect">
+            <a:avLst/>
+          </a:prstGeom>
+          <a:noFill/>
+        </p:spPr>
+        <p:txBody>
+          <a:bodyPr wrap="none" rtlCol="0">
+            <a:spAutoFit/>
+          </a:bodyPr>
+          <a:lstStyle/>
+          <a:p>
+            <a:r>
+              <a:rPr lang="en-ES" sz="1600" i="1" dirty="0"/>
+              <a:t>Building Access DB</a:t>
+            </a:r>
+          </a:p>
+          <a:p>
+            <a:r>
+              <a:rPr lang="en-ES" sz="1400" dirty="0"/>
+              <a:t>[Firebase]</a:t>
+            </a:r>
+          </a:p>
+        </p:txBody>
+      </p:sp>
+      <p:pic>
+        <p:nvPicPr>
+          <p:cNvPr id="40" name="Picture 39" descr="A blue and black logo&#10;&#10;AI-generated content may be incorrect.">
+            <a:extLst>
+              <a:ext uri="{FF2B5EF4-FFF2-40B4-BE49-F238E27FC236}">
+                <a16:creationId xmlns:a16="http://schemas.microsoft.com/office/drawing/2014/main" id="{2FC3BE92-3039-113E-DFB5-1B2AE1336FEA}"/>
+              </a:ext>
+            </a:extLst>
+          </p:cNvPr>
+          <p:cNvPicPr>
+            <a:picLocks noChangeAspect="1"/>
+          </p:cNvPicPr>
+          <p:nvPr/>
+        </p:nvPicPr>
+        <p:blipFill>
+          <a:blip r:embed="rId10"/>
+          <a:stretch>
+            <a:fillRect/>
+          </a:stretch>
+        </p:blipFill>
+        <p:spPr>
+          <a:xfrm>
+            <a:off x="8639046" y="915942"/>
+            <a:ext cx="2713616" cy="1424648"/>
+          </a:xfrm>
+          <a:prstGeom prst="rect">
+            <a:avLst/>
+          </a:prstGeom>
+        </p:spPr>
+      </p:pic>
+      <p:sp>
+        <p:nvSpPr>
+          <p:cNvPr id="48" name="TextBox 47">
+            <a:extLst>
+              <a:ext uri="{FF2B5EF4-FFF2-40B4-BE49-F238E27FC236}">
+                <a16:creationId xmlns:a16="http://schemas.microsoft.com/office/drawing/2014/main" id="{19B00CBC-3EDC-BB48-36B3-A86A300A1620}"/>
+              </a:ext>
+            </a:extLst>
+          </p:cNvPr>
+          <p:cNvSpPr txBox="1"/>
+          <p:nvPr/>
+        </p:nvSpPr>
+        <p:spPr>
+          <a:xfrm>
+            <a:off x="2962314" y="1184002"/>
+            <a:ext cx="1847942" cy="307777"/>
+          </a:xfrm>
+          <a:prstGeom prst="rect">
+            <a:avLst/>
+          </a:prstGeom>
+          <a:noFill/>
+        </p:spPr>
+        <p:txBody>
+          <a:bodyPr wrap="none" rtlCol="0">
+            <a:spAutoFit/>
+          </a:bodyPr>
+          <a:lstStyle/>
+          <a:p>
+            <a:r>
+              <a:rPr lang="en-ES" sz="1400" dirty="0"/>
+              <a:t>Request Pairing Code</a:t>
+            </a:r>
+          </a:p>
+        </p:txBody>
+      </p:sp>
+      <p:sp>
+        <p:nvSpPr>
+          <p:cNvPr id="49" name="TextBox 48">
+            <a:extLst>
+              <a:ext uri="{FF2B5EF4-FFF2-40B4-BE49-F238E27FC236}">
+                <a16:creationId xmlns:a16="http://schemas.microsoft.com/office/drawing/2014/main" id="{EF2EE45B-235A-5187-86EF-10D006FE4186}"/>
+              </a:ext>
+            </a:extLst>
+          </p:cNvPr>
+          <p:cNvSpPr txBox="1"/>
+          <p:nvPr/>
+        </p:nvSpPr>
+        <p:spPr>
+          <a:xfrm>
+            <a:off x="7098571" y="2028581"/>
+            <a:ext cx="1400576" cy="276999"/>
+          </a:xfrm>
+          <a:prstGeom prst="rect">
+            <a:avLst/>
+          </a:prstGeom>
+          <a:noFill/>
+        </p:spPr>
+        <p:txBody>
+          <a:bodyPr wrap="none" rtlCol="0">
+            <a:spAutoFit/>
+          </a:bodyPr>
+          <a:lstStyle/>
+          <a:p>
+            <a:r>
+              <a:rPr lang="en-ES" sz="1200" dirty="0"/>
+              <a:t>Pair (Pairing Code)</a:t>
+            </a:r>
+          </a:p>
+        </p:txBody>
+      </p:sp>
+      <p:cxnSp>
+        <p:nvCxnSpPr>
+          <p:cNvPr id="50" name="Straight Arrow Connector 49">
+            <a:extLst>
+              <a:ext uri="{FF2B5EF4-FFF2-40B4-BE49-F238E27FC236}">
+                <a16:creationId xmlns:a16="http://schemas.microsoft.com/office/drawing/2014/main" id="{0E32074F-1A97-ECDD-025E-DCED4161B4D9}"/>
+              </a:ext>
+            </a:extLst>
+          </p:cNvPr>
+          <p:cNvCxnSpPr>
+            <a:cxnSpLocks/>
+          </p:cNvCxnSpPr>
+          <p:nvPr/>
+        </p:nvCxnSpPr>
+        <p:spPr>
+          <a:xfrm flipV="1">
+            <a:off x="5154128" y="2107493"/>
+            <a:ext cx="4299756" cy="1095808"/>
+          </a:xfrm>
+          <a:prstGeom prst="straightConnector1">
+            <a:avLst/>
+          </a:prstGeom>
+          <a:ln>
+            <a:solidFill>
+              <a:srgbClr val="0070C0"/>
+            </a:solidFill>
+            <a:prstDash val="sysDot"/>
+            <a:headEnd type="triangle"/>
+            <a:tailEnd type="none"/>
+          </a:ln>
+        </p:spPr>
+        <p:style>
+          <a:lnRef idx="2">
+            <a:schemeClr val="accent1"/>
+          </a:lnRef>
+          <a:fillRef idx="0">
+            <a:schemeClr val="accent1"/>
+          </a:fillRef>
+          <a:effectRef idx="1">
+            <a:schemeClr val="accent1"/>
+          </a:effectRef>
+          <a:fontRef idx="minor">
+            <a:schemeClr val="tx1"/>
+          </a:fontRef>
+        </p:style>
+      </p:cxnSp>
+      <p:sp>
+        <p:nvSpPr>
+          <p:cNvPr id="51" name="TextBox 50">
+            <a:extLst>
+              <a:ext uri="{FF2B5EF4-FFF2-40B4-BE49-F238E27FC236}">
+                <a16:creationId xmlns:a16="http://schemas.microsoft.com/office/drawing/2014/main" id="{DB9761F9-4500-CD9F-B97E-8BB3681C8CC0}"/>
+              </a:ext>
+            </a:extLst>
+          </p:cNvPr>
+          <p:cNvSpPr txBox="1"/>
+          <p:nvPr/>
+        </p:nvSpPr>
+        <p:spPr>
+          <a:xfrm>
+            <a:off x="8499476" y="2190786"/>
+            <a:ext cx="920445" cy="276999"/>
+          </a:xfrm>
+          <a:prstGeom prst="rect">
+            <a:avLst/>
+          </a:prstGeom>
+          <a:solidFill>
+            <a:schemeClr val="bg1"/>
+          </a:solidFill>
+        </p:spPr>
+        <p:txBody>
+          <a:bodyPr wrap="square" rtlCol="0">
+            <a:spAutoFit/>
+          </a:bodyPr>
+          <a:lstStyle/>
+          <a:p>
+            <a:r>
+              <a:rPr lang="en-ES" sz="1200" dirty="0">
+                <a:solidFill>
+                  <a:srgbClr val="0070C0"/>
+                </a:solidFill>
+              </a:rPr>
+              <a:t>Account ID</a:t>
+            </a:r>
+          </a:p>
+        </p:txBody>
+      </p:sp>
+      <p:pic>
+        <p:nvPicPr>
+          <p:cNvPr id="53" name="Picture 52" descr="A blue and white logo&#10;&#10;AI-generated content may be incorrect.">
+            <a:extLst>
+              <a:ext uri="{FF2B5EF4-FFF2-40B4-BE49-F238E27FC236}">
+                <a16:creationId xmlns:a16="http://schemas.microsoft.com/office/drawing/2014/main" id="{20309199-A032-DE61-349D-B7E430FDA124}"/>
+              </a:ext>
+            </a:extLst>
+          </p:cNvPr>
+          <p:cNvPicPr>
+            <a:picLocks noChangeAspect="1"/>
+          </p:cNvPicPr>
+          <p:nvPr/>
+        </p:nvPicPr>
+        <p:blipFill>
+          <a:blip r:embed="rId11"/>
+          <a:stretch>
+            <a:fillRect/>
+          </a:stretch>
+        </p:blipFill>
+        <p:spPr>
+          <a:xfrm>
+            <a:off x="938413" y="1335878"/>
+            <a:ext cx="621325" cy="584776"/>
+          </a:xfrm>
+          <a:prstGeom prst="rect">
+            <a:avLst/>
+          </a:prstGeom>
+        </p:spPr>
+      </p:pic>
+      <p:cxnSp>
+        <p:nvCxnSpPr>
+          <p:cNvPr id="54" name="Straight Arrow Connector 53">
+            <a:extLst>
+              <a:ext uri="{FF2B5EF4-FFF2-40B4-BE49-F238E27FC236}">
+                <a16:creationId xmlns:a16="http://schemas.microsoft.com/office/drawing/2014/main" id="{FFEF7FFC-E298-9FBC-091F-9AFE480DBB9B}"/>
+              </a:ext>
+            </a:extLst>
+          </p:cNvPr>
+          <p:cNvCxnSpPr>
+            <a:cxnSpLocks/>
+          </p:cNvCxnSpPr>
+          <p:nvPr/>
+        </p:nvCxnSpPr>
+        <p:spPr>
+          <a:xfrm>
+            <a:off x="1571382" y="2182100"/>
+            <a:ext cx="2981454" cy="867306"/>
+          </a:xfrm>
+          <a:prstGeom prst="straightConnector1">
+            <a:avLst/>
+          </a:prstGeom>
+          <a:ln>
+            <a:tailEnd type="triangle"/>
+          </a:ln>
+        </p:spPr>
+        <p:style>
+          <a:lnRef idx="2">
+            <a:schemeClr val="accent1"/>
+          </a:lnRef>
+          <a:fillRef idx="0">
+            <a:schemeClr val="accent1"/>
+          </a:fillRef>
+          <a:effectRef idx="1">
+            <a:schemeClr val="accent1"/>
+          </a:effectRef>
+          <a:fontRef idx="minor">
+            <a:schemeClr val="tx1"/>
+          </a:fontRef>
+        </p:style>
+      </p:cxnSp>
+      <p:cxnSp>
+        <p:nvCxnSpPr>
+          <p:cNvPr id="17" name="Straight Arrow Connector 16">
+            <a:extLst>
+              <a:ext uri="{FF2B5EF4-FFF2-40B4-BE49-F238E27FC236}">
+                <a16:creationId xmlns:a16="http://schemas.microsoft.com/office/drawing/2014/main" id="{727E8319-1148-10FC-0620-887D6F84597F}"/>
+              </a:ext>
+            </a:extLst>
+          </p:cNvPr>
+          <p:cNvCxnSpPr>
+            <a:cxnSpLocks/>
+          </p:cNvCxnSpPr>
+          <p:nvPr/>
+        </p:nvCxnSpPr>
+        <p:spPr>
+          <a:xfrm>
+            <a:off x="1648496" y="1486279"/>
+            <a:ext cx="7805388" cy="0"/>
+          </a:xfrm>
+          <a:prstGeom prst="straightConnector1">
+            <a:avLst/>
+          </a:prstGeom>
+          <a:ln>
+            <a:tailEnd type="triangle"/>
+          </a:ln>
+        </p:spPr>
+        <p:style>
+          <a:lnRef idx="2">
+            <a:schemeClr val="accent1"/>
+          </a:lnRef>
+          <a:fillRef idx="0">
+            <a:schemeClr val="accent1"/>
+          </a:fillRef>
+          <a:effectRef idx="1">
+            <a:schemeClr val="accent1"/>
+          </a:effectRef>
+          <a:fontRef idx="minor">
+            <a:schemeClr val="tx1"/>
+          </a:fontRef>
+        </p:style>
+      </p:cxnSp>
+      <p:cxnSp>
+        <p:nvCxnSpPr>
+          <p:cNvPr id="61" name="Straight Arrow Connector 60">
+            <a:extLst>
+              <a:ext uri="{FF2B5EF4-FFF2-40B4-BE49-F238E27FC236}">
+                <a16:creationId xmlns:a16="http://schemas.microsoft.com/office/drawing/2014/main" id="{14280EA4-4DEC-A85C-9B7F-5BB4658D9315}"/>
+              </a:ext>
+            </a:extLst>
+          </p:cNvPr>
+          <p:cNvCxnSpPr>
+            <a:cxnSpLocks/>
+          </p:cNvCxnSpPr>
+          <p:nvPr/>
+        </p:nvCxnSpPr>
+        <p:spPr>
+          <a:xfrm>
+            <a:off x="1608976" y="1662505"/>
+            <a:ext cx="7844908" cy="0"/>
+          </a:xfrm>
+          <a:prstGeom prst="straightConnector1">
+            <a:avLst/>
+          </a:prstGeom>
+          <a:ln>
+            <a:solidFill>
+              <a:srgbClr val="0070C0"/>
+            </a:solidFill>
+            <a:prstDash val="sysDot"/>
+            <a:headEnd type="triangle"/>
+            <a:tailEnd type="none"/>
+          </a:ln>
+        </p:spPr>
+        <p:style>
+          <a:lnRef idx="2">
+            <a:schemeClr val="accent1"/>
+          </a:lnRef>
+          <a:fillRef idx="0">
+            <a:schemeClr val="accent1"/>
+          </a:fillRef>
+          <a:effectRef idx="1">
+            <a:schemeClr val="accent1"/>
+          </a:effectRef>
+          <a:fontRef idx="minor">
+            <a:schemeClr val="tx1"/>
+          </a:fontRef>
+        </p:style>
+      </p:cxnSp>
+      <p:sp>
+        <p:nvSpPr>
+          <p:cNvPr id="63" name="TextBox 62">
+            <a:extLst>
+              <a:ext uri="{FF2B5EF4-FFF2-40B4-BE49-F238E27FC236}">
+                <a16:creationId xmlns:a16="http://schemas.microsoft.com/office/drawing/2014/main" id="{A0AEF8BD-FB81-5E2D-41F5-A42E93668186}"/>
+              </a:ext>
+            </a:extLst>
+          </p:cNvPr>
+          <p:cNvSpPr txBox="1"/>
+          <p:nvPr/>
+        </p:nvSpPr>
+        <p:spPr>
+          <a:xfrm>
+            <a:off x="2004304" y="2053964"/>
+            <a:ext cx="1400576" cy="276999"/>
+          </a:xfrm>
+          <a:prstGeom prst="rect">
+            <a:avLst/>
+          </a:prstGeom>
+          <a:noFill/>
+        </p:spPr>
+        <p:txBody>
+          <a:bodyPr wrap="none" rtlCol="0">
+            <a:spAutoFit/>
+          </a:bodyPr>
+          <a:lstStyle/>
+          <a:p>
+            <a:r>
+              <a:rPr lang="en-ES" sz="1200" dirty="0"/>
+              <a:t>Pair (Pairing Code)</a:t>
+            </a:r>
+          </a:p>
+        </p:txBody>
+      </p:sp>
+      <p:cxnSp>
+        <p:nvCxnSpPr>
+          <p:cNvPr id="66" name="Straight Arrow Connector 65">
+            <a:extLst>
+              <a:ext uri="{FF2B5EF4-FFF2-40B4-BE49-F238E27FC236}">
+                <a16:creationId xmlns:a16="http://schemas.microsoft.com/office/drawing/2014/main" id="{71DB3877-E862-992E-5715-912EDB364151}"/>
+              </a:ext>
+            </a:extLst>
+          </p:cNvPr>
+          <p:cNvCxnSpPr>
+            <a:cxnSpLocks/>
+          </p:cNvCxnSpPr>
+          <p:nvPr/>
+        </p:nvCxnSpPr>
+        <p:spPr>
+          <a:xfrm>
+            <a:off x="1586351" y="2307158"/>
+            <a:ext cx="2930004" cy="855156"/>
+          </a:xfrm>
+          <a:prstGeom prst="straightConnector1">
+            <a:avLst/>
+          </a:prstGeom>
+          <a:ln>
+            <a:solidFill>
+              <a:srgbClr val="0070C0"/>
+            </a:solidFill>
+            <a:prstDash val="sysDot"/>
+            <a:headEnd type="triangle"/>
+            <a:tailEnd type="none"/>
+          </a:ln>
+        </p:spPr>
+        <p:style>
+          <a:lnRef idx="2">
+            <a:schemeClr val="accent1"/>
+          </a:lnRef>
+          <a:fillRef idx="0">
+            <a:schemeClr val="accent1"/>
+          </a:fillRef>
+          <a:effectRef idx="1">
+            <a:schemeClr val="accent1"/>
+          </a:effectRef>
+          <a:fontRef idx="minor">
+            <a:schemeClr val="tx1"/>
+          </a:fontRef>
+        </p:style>
+      </p:cxnSp>
+      <p:cxnSp>
+        <p:nvCxnSpPr>
+          <p:cNvPr id="11" name="Straight Arrow Connector 10">
+            <a:extLst>
+              <a:ext uri="{FF2B5EF4-FFF2-40B4-BE49-F238E27FC236}">
+                <a16:creationId xmlns:a16="http://schemas.microsoft.com/office/drawing/2014/main" id="{309C5DFA-DF71-ABDF-A212-9C7D47190773}"/>
+              </a:ext>
+            </a:extLst>
+          </p:cNvPr>
+          <p:cNvCxnSpPr>
+            <a:cxnSpLocks/>
+          </p:cNvCxnSpPr>
+          <p:nvPr/>
+        </p:nvCxnSpPr>
+        <p:spPr>
+          <a:xfrm flipV="1">
+            <a:off x="5142335" y="1997090"/>
+            <a:ext cx="4345073" cy="1081848"/>
+          </a:xfrm>
+          <a:prstGeom prst="straightConnector1">
+            <a:avLst/>
+          </a:prstGeom>
+          <a:ln>
+            <a:tailEnd type="triangle"/>
+          </a:ln>
+        </p:spPr>
+        <p:style>
+          <a:lnRef idx="2">
+            <a:schemeClr val="accent1"/>
+          </a:lnRef>
+          <a:fillRef idx="0">
+            <a:schemeClr val="accent1"/>
+          </a:fillRef>
+          <a:effectRef idx="1">
+            <a:schemeClr val="accent1"/>
+          </a:effectRef>
+          <a:fontRef idx="minor">
+            <a:schemeClr val="tx1"/>
+          </a:fontRef>
+        </p:style>
+      </p:cxnSp>
+      <p:sp>
+        <p:nvSpPr>
+          <p:cNvPr id="78" name="TextBox 77">
+            <a:extLst>
+              <a:ext uri="{FF2B5EF4-FFF2-40B4-BE49-F238E27FC236}">
+                <a16:creationId xmlns:a16="http://schemas.microsoft.com/office/drawing/2014/main" id="{74FE005F-1550-5393-9606-7570EE0E9864}"/>
+              </a:ext>
+            </a:extLst>
+          </p:cNvPr>
+          <p:cNvSpPr txBox="1"/>
+          <p:nvPr/>
+        </p:nvSpPr>
+        <p:spPr>
+          <a:xfrm>
+            <a:off x="2783092" y="4516925"/>
+            <a:ext cx="1171539" cy="461665"/>
+          </a:xfrm>
+          <a:prstGeom prst="rect">
+            <a:avLst/>
+          </a:prstGeom>
+          <a:noFill/>
+        </p:spPr>
+        <p:txBody>
+          <a:bodyPr wrap="none" rtlCol="0">
+            <a:spAutoFit/>
+          </a:bodyPr>
+          <a:lstStyle/>
+          <a:p>
+            <a:r>
+              <a:rPr lang="en-ES" sz="1200" dirty="0"/>
+              <a:t>Account ID +</a:t>
+            </a:r>
+          </a:p>
+          <a:p>
+            <a:r>
+              <a:rPr lang="en-ES" sz="1200" dirty="0"/>
+              <a:t>Access Details</a:t>
+            </a:r>
+          </a:p>
+        </p:txBody>
+      </p:sp>
+      <p:sp>
+        <p:nvSpPr>
+          <p:cNvPr id="85" name="TextBox 84">
+            <a:extLst>
+              <a:ext uri="{FF2B5EF4-FFF2-40B4-BE49-F238E27FC236}">
+                <a16:creationId xmlns:a16="http://schemas.microsoft.com/office/drawing/2014/main" id="{5AF9F3DD-1538-605F-1CCE-EB9CFAA76A69}"/>
+              </a:ext>
+            </a:extLst>
+          </p:cNvPr>
+          <p:cNvSpPr txBox="1"/>
+          <p:nvPr/>
+        </p:nvSpPr>
+        <p:spPr>
+          <a:xfrm>
+            <a:off x="3094044" y="1640035"/>
+            <a:ext cx="6097656" cy="307777"/>
+          </a:xfrm>
+          <a:prstGeom prst="rect">
+            <a:avLst/>
+          </a:prstGeom>
+          <a:noFill/>
+        </p:spPr>
+        <p:txBody>
+          <a:bodyPr wrap="square">
+            <a:spAutoFit/>
+          </a:bodyPr>
+          <a:lstStyle/>
+          <a:p>
+            <a:r>
+              <a:rPr lang="en-ES" sz="1400" dirty="0">
+                <a:solidFill>
+                  <a:srgbClr val="0070C0"/>
+                </a:solidFill>
+              </a:rPr>
+              <a:t>Pairing Code</a:t>
+            </a:r>
+          </a:p>
+        </p:txBody>
+      </p:sp>
+      <p:sp>
+        <p:nvSpPr>
+          <p:cNvPr id="87" name="Title 1">
+            <a:extLst>
+              <a:ext uri="{FF2B5EF4-FFF2-40B4-BE49-F238E27FC236}">
+                <a16:creationId xmlns:a16="http://schemas.microsoft.com/office/drawing/2014/main" id="{7060A800-91BD-C2D0-AC63-8ADB782CAA43}"/>
+              </a:ext>
+            </a:extLst>
+          </p:cNvPr>
+          <p:cNvSpPr txBox="1">
+            <a:spLocks/>
+          </p:cNvSpPr>
+          <p:nvPr/>
+        </p:nvSpPr>
+        <p:spPr>
+          <a:xfrm>
+            <a:off x="668840" y="126528"/>
+            <a:ext cx="10515600" cy="760409"/>
+          </a:xfrm>
+          <a:prstGeom prst="rect">
+            <a:avLst/>
+          </a:prstGeom>
+        </p:spPr>
+        <p:txBody>
+          <a:bodyPr vert="horz" lIns="91440" tIns="45720" rIns="91440" bIns="45720" rtlCol="0" anchor="b">
+            <a:normAutofit/>
+          </a:bodyPr>
+          <a:lstStyle>
+            <a:lvl1pPr algn="ctr" defTabSz="914400" rtl="0" eaLnBrk="1" latinLnBrk="0" hangingPunct="1">
+              <a:lnSpc>
+                <a:spcPct val="90000"/>
+              </a:lnSpc>
+              <a:spcBef>
+                <a:spcPct val="0"/>
+              </a:spcBef>
+              <a:buNone/>
+              <a:defRPr sz="6000" kern="1200">
+                <a:solidFill>
+                  <a:schemeClr val="tx1"/>
+                </a:solidFill>
+                <a:latin typeface="+mj-lt"/>
+                <a:ea typeface="+mj-ea"/>
+                <a:cs typeface="+mj-cs"/>
+              </a:defRPr>
+            </a:lvl1pPr>
+          </a:lstStyle>
+          <a:p>
+            <a:r>
+              <a:rPr lang="en-ES" sz="4800" b="1" dirty="0">
+                <a:solidFill>
+                  <a:srgbClr val="2F3649"/>
+                </a:solidFill>
+                <a:latin typeface="Arial Rounded MT Bold" panose="020F0704030504030204" pitchFamily="34" charset="77"/>
+              </a:rPr>
+              <a:t>Latch tu Flutter: Operations</a:t>
+            </a:r>
+          </a:p>
+        </p:txBody>
+      </p:sp>
+      <p:cxnSp>
+        <p:nvCxnSpPr>
+          <p:cNvPr id="19" name="Straight Arrow Connector 18">
+            <a:extLst>
+              <a:ext uri="{FF2B5EF4-FFF2-40B4-BE49-F238E27FC236}">
+                <a16:creationId xmlns:a16="http://schemas.microsoft.com/office/drawing/2014/main" id="{14981189-416C-A26D-D953-8F9FD838D8D3}"/>
+              </a:ext>
+            </a:extLst>
+          </p:cNvPr>
+          <p:cNvCxnSpPr>
+            <a:cxnSpLocks/>
+          </p:cNvCxnSpPr>
+          <p:nvPr/>
+        </p:nvCxnSpPr>
+        <p:spPr>
+          <a:xfrm>
+            <a:off x="1586351" y="2532065"/>
+            <a:ext cx="2981425" cy="921083"/>
+          </a:xfrm>
+          <a:prstGeom prst="straightConnector1">
+            <a:avLst/>
+          </a:prstGeom>
+          <a:ln>
+            <a:tailEnd type="triangle"/>
+          </a:ln>
+        </p:spPr>
+        <p:style>
+          <a:lnRef idx="2">
+            <a:schemeClr val="accent1"/>
+          </a:lnRef>
+          <a:fillRef idx="0">
+            <a:schemeClr val="accent1"/>
+          </a:fillRef>
+          <a:effectRef idx="1">
+            <a:schemeClr val="accent1"/>
+          </a:effectRef>
+          <a:fontRef idx="minor">
+            <a:schemeClr val="tx1"/>
+          </a:fontRef>
+        </p:style>
+      </p:cxnSp>
+      <p:sp>
+        <p:nvSpPr>
+          <p:cNvPr id="20" name="TextBox 19">
+            <a:extLst>
+              <a:ext uri="{FF2B5EF4-FFF2-40B4-BE49-F238E27FC236}">
+                <a16:creationId xmlns:a16="http://schemas.microsoft.com/office/drawing/2014/main" id="{04D20503-888C-BC81-6A07-B7311CD2E571}"/>
+              </a:ext>
+            </a:extLst>
+          </p:cNvPr>
+          <p:cNvSpPr txBox="1"/>
+          <p:nvPr/>
+        </p:nvSpPr>
+        <p:spPr>
+          <a:xfrm>
+            <a:off x="2538524" y="3008675"/>
+            <a:ext cx="1010213" cy="461665"/>
+          </a:xfrm>
+          <a:prstGeom prst="rect">
+            <a:avLst/>
+          </a:prstGeom>
+          <a:noFill/>
+        </p:spPr>
+        <p:txBody>
+          <a:bodyPr wrap="none" rtlCol="0">
+            <a:spAutoFit/>
+          </a:bodyPr>
+          <a:lstStyle/>
+          <a:p>
+            <a:r>
+              <a:rPr lang="en-ES" sz="1200" dirty="0"/>
+              <a:t>Operation </a:t>
+            </a:r>
+          </a:p>
+          <a:p>
+            <a:r>
+              <a:rPr lang="en-ES" sz="1200" dirty="0"/>
+              <a:t>(Account ID)</a:t>
+            </a:r>
+          </a:p>
+        </p:txBody>
+      </p:sp>
+      <p:cxnSp>
+        <p:nvCxnSpPr>
+          <p:cNvPr id="22" name="Straight Arrow Connector 21">
+            <a:extLst>
+              <a:ext uri="{FF2B5EF4-FFF2-40B4-BE49-F238E27FC236}">
+                <a16:creationId xmlns:a16="http://schemas.microsoft.com/office/drawing/2014/main" id="{29861A07-CB39-DF6E-CEC3-C1FBF24073A4}"/>
+              </a:ext>
+            </a:extLst>
+          </p:cNvPr>
+          <p:cNvCxnSpPr>
+            <a:cxnSpLocks/>
+          </p:cNvCxnSpPr>
+          <p:nvPr/>
+        </p:nvCxnSpPr>
+        <p:spPr>
+          <a:xfrm flipV="1">
+            <a:off x="5134105" y="2171968"/>
+            <a:ext cx="4839435" cy="1255399"/>
+          </a:xfrm>
+          <a:prstGeom prst="straightConnector1">
+            <a:avLst/>
+          </a:prstGeom>
+          <a:ln>
+            <a:tailEnd type="triangle"/>
+          </a:ln>
+        </p:spPr>
+        <p:style>
+          <a:lnRef idx="2">
+            <a:schemeClr val="accent1"/>
+          </a:lnRef>
+          <a:fillRef idx="0">
+            <a:schemeClr val="accent1"/>
+          </a:fillRef>
+          <a:effectRef idx="1">
+            <a:schemeClr val="accent1"/>
+          </a:effectRef>
+          <a:fontRef idx="minor">
+            <a:schemeClr val="tx1"/>
+          </a:fontRef>
+        </p:style>
+      </p:cxnSp>
+      <p:sp>
+        <p:nvSpPr>
+          <p:cNvPr id="30" name="TextBox 29">
+            <a:extLst>
+              <a:ext uri="{FF2B5EF4-FFF2-40B4-BE49-F238E27FC236}">
+                <a16:creationId xmlns:a16="http://schemas.microsoft.com/office/drawing/2014/main" id="{8A873ECD-D42D-4BC4-FEFA-F46FD1A0A12E}"/>
+              </a:ext>
+            </a:extLst>
+          </p:cNvPr>
+          <p:cNvSpPr txBox="1"/>
+          <p:nvPr/>
+        </p:nvSpPr>
+        <p:spPr>
+          <a:xfrm>
+            <a:off x="6863331" y="2918532"/>
+            <a:ext cx="1010213" cy="461665"/>
+          </a:xfrm>
+          <a:prstGeom prst="rect">
+            <a:avLst/>
+          </a:prstGeom>
+          <a:noFill/>
+        </p:spPr>
+        <p:txBody>
+          <a:bodyPr wrap="none" rtlCol="0">
+            <a:spAutoFit/>
+          </a:bodyPr>
+          <a:lstStyle/>
+          <a:p>
+            <a:r>
+              <a:rPr lang="en-ES" sz="1200" dirty="0"/>
+              <a:t>Operation </a:t>
+            </a:r>
+          </a:p>
+          <a:p>
+            <a:r>
+              <a:rPr lang="en-ES" sz="1200" dirty="0"/>
+              <a:t>(Account ID)</a:t>
+            </a:r>
           </a:p>
         </p:txBody>
       </p:sp>
     </p:spTree>
     <p:extLst>
       <p:ext uri="{BB962C8B-B14F-4D97-AF65-F5344CB8AC3E}">
-        <p14:creationId xmlns:p14="http://schemas.microsoft.com/office/powerpoint/2010/main" val="299526368"/>
+        <p14:creationId xmlns:p14="http://schemas.microsoft.com/office/powerpoint/2010/main" val="1896908938"/>
+      </p:ext>
+    </p:extLst>
+  </p:cSld>
+  <p:clrMapOvr>
+    <a:masterClrMapping/>
+  </p:clrMapOvr>
+</p:sld>
+</file>
+
+<file path=ppt/slides/slide3.xml><?xml version="1.0" encoding="utf-8"?>
+<p:sld xmlns:a="http://schemas.openxmlformats.org/drawingml/2006/main" xmlns:r="http://schemas.openxmlformats.org/officeDocument/2006/relationships" xmlns:p="http://schemas.openxmlformats.org/presentationml/2006/main">
+  <p:cSld>
+    <p:spTree>
+      <p:nvGrpSpPr>
+        <p:cNvPr id="1" name="">
+          <a:extLst>
+            <a:ext uri="{FF2B5EF4-FFF2-40B4-BE49-F238E27FC236}">
+              <a16:creationId xmlns:a16="http://schemas.microsoft.com/office/drawing/2014/main" id="{3DB545C9-870B-B76E-ED82-B6C97D6F2EE0}"/>
+            </a:ext>
+          </a:extLst>
+        </p:cNvPr>
+        <p:cNvGrpSpPr/>
+        <p:nvPr/>
+      </p:nvGrpSpPr>
+      <p:grpSpPr>
+        <a:xfrm>
+          <a:off x="0" y="0"/>
+          <a:ext cx="0" cy="0"/>
+          <a:chOff x="0" y="0"/>
+          <a:chExt cx="0" cy="0"/>
+        </a:xfrm>
+      </p:grpSpPr>
+      <p:pic>
+        <p:nvPicPr>
+          <p:cNvPr id="37" name="Picture 36" descr="A black background with a black square&#10;&#10;AI-generated content may be incorrect.">
+            <a:extLst>
+              <a:ext uri="{FF2B5EF4-FFF2-40B4-BE49-F238E27FC236}">
+                <a16:creationId xmlns:a16="http://schemas.microsoft.com/office/drawing/2014/main" id="{75ADF6D1-59D8-41E9-6462-72AED9115FB9}"/>
+              </a:ext>
+            </a:extLst>
+          </p:cNvPr>
+          <p:cNvPicPr>
+            <a:picLocks noChangeAspect="1"/>
+          </p:cNvPicPr>
+          <p:nvPr/>
+        </p:nvPicPr>
+        <p:blipFill>
+          <a:blip r:embed="rId2"/>
+          <a:stretch>
+            <a:fillRect/>
+          </a:stretch>
+        </p:blipFill>
+        <p:spPr>
+          <a:xfrm>
+            <a:off x="299481" y="1457492"/>
+            <a:ext cx="1866604" cy="2139043"/>
+          </a:xfrm>
+          <a:prstGeom prst="rect">
+            <a:avLst/>
+          </a:prstGeom>
+        </p:spPr>
+      </p:pic>
+      <p:sp>
+        <p:nvSpPr>
+          <p:cNvPr id="24" name="Rounded Rectangle 23">
+            <a:extLst>
+              <a:ext uri="{FF2B5EF4-FFF2-40B4-BE49-F238E27FC236}">
+                <a16:creationId xmlns:a16="http://schemas.microsoft.com/office/drawing/2014/main" id="{202CE8F0-A640-73C8-290E-F6FBDF73CB45}"/>
+              </a:ext>
+            </a:extLst>
+          </p:cNvPr>
+          <p:cNvSpPr/>
+          <p:nvPr/>
+        </p:nvSpPr>
+        <p:spPr>
+          <a:xfrm>
+            <a:off x="4109156" y="3095255"/>
+            <a:ext cx="3973688" cy="1758113"/>
+          </a:xfrm>
+          <a:prstGeom prst="roundRect">
+            <a:avLst/>
+          </a:prstGeom>
+          <a:solidFill>
+            <a:schemeClr val="tx2">
+              <a:lumMod val="10000"/>
+              <a:lumOff val="90000"/>
+            </a:schemeClr>
+          </a:solidFill>
+          <a:ln>
+            <a:noFill/>
+          </a:ln>
+        </p:spPr>
+        <p:style>
+          <a:lnRef idx="2">
+            <a:schemeClr val="accent1">
+              <a:shade val="15000"/>
+            </a:schemeClr>
+          </a:lnRef>
+          <a:fillRef idx="1">
+            <a:schemeClr val="accent1"/>
+          </a:fillRef>
+          <a:effectRef idx="0">
+            <a:schemeClr val="accent1"/>
+          </a:effectRef>
+          <a:fontRef idx="minor">
+            <a:schemeClr val="lt1"/>
+          </a:fontRef>
+        </p:style>
+        <p:txBody>
+          <a:bodyPr rtlCol="0" anchor="ctr"/>
+          <a:lstStyle/>
+          <a:p>
+            <a:pPr algn="ctr"/>
+            <a:endParaRPr lang="en-ES"/>
+          </a:p>
+        </p:txBody>
+      </p:sp>
+      <p:pic>
+        <p:nvPicPr>
+          <p:cNvPr id="5" name="Graphic 4">
+            <a:extLst>
+              <a:ext uri="{FF2B5EF4-FFF2-40B4-BE49-F238E27FC236}">
+                <a16:creationId xmlns:a16="http://schemas.microsoft.com/office/drawing/2014/main" id="{91D51B37-FC49-37CD-0F38-1A20D369ABDE}"/>
+              </a:ext>
+            </a:extLst>
+          </p:cNvPr>
+          <p:cNvPicPr>
+            <a:picLocks noChangeAspect="1"/>
+          </p:cNvPicPr>
+          <p:nvPr/>
+        </p:nvPicPr>
+        <p:blipFill>
+          <a:blip r:embed="rId3">
+            <a:extLst>
+              <a:ext uri="{96DAC541-7B7A-43D3-8B79-37D633B846F1}">
+                <asvg:svgBlip xmlns:asvg="http://schemas.microsoft.com/office/drawing/2016/SVG/main" r:embed="rId4"/>
+              </a:ext>
+            </a:extLst>
+          </a:blip>
+          <a:stretch>
+            <a:fillRect/>
+          </a:stretch>
+        </p:blipFill>
+        <p:spPr>
+          <a:xfrm>
+            <a:off x="4531986" y="3491494"/>
+            <a:ext cx="601292" cy="601292"/>
+          </a:xfrm>
+          <a:prstGeom prst="rect">
+            <a:avLst/>
+          </a:prstGeom>
+        </p:spPr>
+      </p:pic>
+      <p:pic>
+        <p:nvPicPr>
+          <p:cNvPr id="7" name="Picture 6">
+            <a:extLst>
+              <a:ext uri="{FF2B5EF4-FFF2-40B4-BE49-F238E27FC236}">
+                <a16:creationId xmlns:a16="http://schemas.microsoft.com/office/drawing/2014/main" id="{6C91ACE0-0440-AAE8-370F-4AE4D315EA56}"/>
+              </a:ext>
+            </a:extLst>
+          </p:cNvPr>
+          <p:cNvPicPr>
+            <a:picLocks noChangeAspect="1"/>
+          </p:cNvPicPr>
+          <p:nvPr/>
+        </p:nvPicPr>
+        <p:blipFill>
+          <a:blip r:embed="rId5"/>
+          <a:stretch>
+            <a:fillRect/>
+          </a:stretch>
+        </p:blipFill>
+        <p:spPr>
+          <a:xfrm>
+            <a:off x="7674712" y="4278858"/>
+            <a:ext cx="600562" cy="600562"/>
+          </a:xfrm>
+          <a:prstGeom prst="rect">
+            <a:avLst/>
+          </a:prstGeom>
+        </p:spPr>
+      </p:pic>
+      <p:sp>
+        <p:nvSpPr>
+          <p:cNvPr id="12" name="TextBox 11">
+            <a:extLst>
+              <a:ext uri="{FF2B5EF4-FFF2-40B4-BE49-F238E27FC236}">
+                <a16:creationId xmlns:a16="http://schemas.microsoft.com/office/drawing/2014/main" id="{CB951812-3C59-F18C-80C0-6212A469C6E7}"/>
+              </a:ext>
+            </a:extLst>
+          </p:cNvPr>
+          <p:cNvSpPr txBox="1"/>
+          <p:nvPr/>
+        </p:nvSpPr>
+        <p:spPr>
+          <a:xfrm>
+            <a:off x="4420768" y="4120587"/>
+            <a:ext cx="2468625" cy="553998"/>
+          </a:xfrm>
+          <a:prstGeom prst="rect">
+            <a:avLst/>
+          </a:prstGeom>
+          <a:noFill/>
+        </p:spPr>
+        <p:txBody>
+          <a:bodyPr wrap="none" rtlCol="0">
+            <a:spAutoFit/>
+          </a:bodyPr>
+          <a:lstStyle/>
+          <a:p>
+            <a:r>
+              <a:rPr lang="en-ES" sz="1600" i="1" dirty="0"/>
+              <a:t>latch_tu_flutter_ws</a:t>
+            </a:r>
+          </a:p>
+          <a:p>
+            <a:r>
+              <a:rPr lang="en-ES" sz="1400" dirty="0"/>
+              <a:t>[App Service / Linux /  Python]</a:t>
+            </a:r>
+          </a:p>
+        </p:txBody>
+      </p:sp>
+      <p:sp>
+        <p:nvSpPr>
+          <p:cNvPr id="13" name="TextBox 12">
+            <a:extLst>
+              <a:ext uri="{FF2B5EF4-FFF2-40B4-BE49-F238E27FC236}">
+                <a16:creationId xmlns:a16="http://schemas.microsoft.com/office/drawing/2014/main" id="{244EA789-56A4-1CEF-E57D-728C7EA9F9DC}"/>
+              </a:ext>
+            </a:extLst>
+          </p:cNvPr>
+          <p:cNvSpPr txBox="1"/>
+          <p:nvPr/>
+        </p:nvSpPr>
+        <p:spPr>
+          <a:xfrm>
+            <a:off x="8240078" y="4323433"/>
+            <a:ext cx="955903" cy="523220"/>
+          </a:xfrm>
+          <a:prstGeom prst="rect">
+            <a:avLst/>
+          </a:prstGeom>
+          <a:noFill/>
+        </p:spPr>
+        <p:txBody>
+          <a:bodyPr wrap="none" rtlCol="0">
+            <a:spAutoFit/>
+          </a:bodyPr>
+          <a:lstStyle/>
+          <a:p>
+            <a:r>
+              <a:rPr lang="en-ES" sz="1400" dirty="0"/>
+              <a:t>Microsoft </a:t>
+            </a:r>
+          </a:p>
+          <a:p>
+            <a:r>
+              <a:rPr lang="en-ES" sz="1400" dirty="0"/>
+              <a:t>Azure </a:t>
+            </a:r>
+          </a:p>
+        </p:txBody>
+      </p:sp>
+      <p:pic>
+        <p:nvPicPr>
+          <p:cNvPr id="15" name="Picture 14" descr="A blue and black logo&#10;&#10;AI-generated content may be incorrect.">
+            <a:extLst>
+              <a:ext uri="{FF2B5EF4-FFF2-40B4-BE49-F238E27FC236}">
+                <a16:creationId xmlns:a16="http://schemas.microsoft.com/office/drawing/2014/main" id="{FFADCDA4-2EDA-5BDC-DE00-4A9274330F64}"/>
+              </a:ext>
+            </a:extLst>
+          </p:cNvPr>
+          <p:cNvPicPr>
+            <a:picLocks noChangeAspect="1"/>
+          </p:cNvPicPr>
+          <p:nvPr/>
+        </p:nvPicPr>
+        <p:blipFill>
+          <a:blip r:embed="rId6"/>
+          <a:stretch>
+            <a:fillRect/>
+          </a:stretch>
+        </p:blipFill>
+        <p:spPr>
+          <a:xfrm>
+            <a:off x="905687" y="2463621"/>
+            <a:ext cx="613298" cy="584776"/>
+          </a:xfrm>
+          <a:prstGeom prst="rect">
+            <a:avLst/>
+          </a:prstGeom>
+        </p:spPr>
+      </p:pic>
+      <p:sp>
+        <p:nvSpPr>
+          <p:cNvPr id="16" name="TextBox 15">
+            <a:extLst>
+              <a:ext uri="{FF2B5EF4-FFF2-40B4-BE49-F238E27FC236}">
+                <a16:creationId xmlns:a16="http://schemas.microsoft.com/office/drawing/2014/main" id="{BD8D8D85-EF14-F1AE-D950-E61AB6F01FAD}"/>
+              </a:ext>
+            </a:extLst>
+          </p:cNvPr>
+          <p:cNvSpPr txBox="1"/>
+          <p:nvPr/>
+        </p:nvSpPr>
+        <p:spPr>
+          <a:xfrm>
+            <a:off x="276978" y="3612109"/>
+            <a:ext cx="1962332" cy="553998"/>
+          </a:xfrm>
+          <a:prstGeom prst="rect">
+            <a:avLst/>
+          </a:prstGeom>
+          <a:noFill/>
+        </p:spPr>
+        <p:txBody>
+          <a:bodyPr wrap="none" rtlCol="0">
+            <a:spAutoFit/>
+          </a:bodyPr>
+          <a:lstStyle/>
+          <a:p>
+            <a:r>
+              <a:rPr lang="en-ES" sz="1600" i="1" dirty="0"/>
+              <a:t>latch_tu_flutter_app</a:t>
+            </a:r>
+            <a:endParaRPr lang="en-ES" sz="1600" dirty="0"/>
+          </a:p>
+          <a:p>
+            <a:r>
+              <a:rPr lang="en-ES" sz="1400" dirty="0"/>
+              <a:t>[Flutter / iOS / Android]</a:t>
+            </a:r>
+          </a:p>
+        </p:txBody>
+      </p:sp>
+      <p:pic>
+        <p:nvPicPr>
+          <p:cNvPr id="40" name="Picture 39" descr="A blue and black logo&#10;&#10;AI-generated content may be incorrect.">
+            <a:extLst>
+              <a:ext uri="{FF2B5EF4-FFF2-40B4-BE49-F238E27FC236}">
+                <a16:creationId xmlns:a16="http://schemas.microsoft.com/office/drawing/2014/main" id="{951BD108-E3F8-64EA-05E8-292E5AE9B798}"/>
+              </a:ext>
+            </a:extLst>
+          </p:cNvPr>
+          <p:cNvPicPr>
+            <a:picLocks noChangeAspect="1"/>
+          </p:cNvPicPr>
+          <p:nvPr/>
+        </p:nvPicPr>
+        <p:blipFill>
+          <a:blip r:embed="rId7"/>
+          <a:stretch>
+            <a:fillRect/>
+          </a:stretch>
+        </p:blipFill>
+        <p:spPr>
+          <a:xfrm>
+            <a:off x="8618196" y="1382473"/>
+            <a:ext cx="2713616" cy="1424648"/>
+          </a:xfrm>
+          <a:prstGeom prst="rect">
+            <a:avLst/>
+          </a:prstGeom>
+        </p:spPr>
+      </p:pic>
+      <p:sp>
+        <p:nvSpPr>
+          <p:cNvPr id="48" name="TextBox 47">
+            <a:extLst>
+              <a:ext uri="{FF2B5EF4-FFF2-40B4-BE49-F238E27FC236}">
+                <a16:creationId xmlns:a16="http://schemas.microsoft.com/office/drawing/2014/main" id="{BD4FC595-B287-5966-F89B-C2AA024F2CA0}"/>
+              </a:ext>
+            </a:extLst>
+          </p:cNvPr>
+          <p:cNvSpPr txBox="1"/>
+          <p:nvPr/>
+        </p:nvSpPr>
+        <p:spPr>
+          <a:xfrm>
+            <a:off x="2941464" y="1650533"/>
+            <a:ext cx="1434175" cy="307777"/>
+          </a:xfrm>
+          <a:prstGeom prst="rect">
+            <a:avLst/>
+          </a:prstGeom>
+          <a:noFill/>
+        </p:spPr>
+        <p:txBody>
+          <a:bodyPr wrap="none" rtlCol="0">
+            <a:spAutoFit/>
+          </a:bodyPr>
+          <a:lstStyle/>
+          <a:p>
+            <a:r>
+              <a:rPr lang="en-ES" sz="1400" dirty="0"/>
+              <a:t>Latch Operation</a:t>
+            </a:r>
+          </a:p>
+        </p:txBody>
+      </p:sp>
+      <p:sp>
+        <p:nvSpPr>
+          <p:cNvPr id="49" name="TextBox 48">
+            <a:extLst>
+              <a:ext uri="{FF2B5EF4-FFF2-40B4-BE49-F238E27FC236}">
+                <a16:creationId xmlns:a16="http://schemas.microsoft.com/office/drawing/2014/main" id="{15B10BDA-225F-BAB8-7050-A1AE048C5C1D}"/>
+              </a:ext>
+            </a:extLst>
+          </p:cNvPr>
+          <p:cNvSpPr txBox="1"/>
+          <p:nvPr/>
+        </p:nvSpPr>
+        <p:spPr>
+          <a:xfrm>
+            <a:off x="6743610" y="2670366"/>
+            <a:ext cx="1572097" cy="307777"/>
+          </a:xfrm>
+          <a:prstGeom prst="rect">
+            <a:avLst/>
+          </a:prstGeom>
+          <a:noFill/>
+        </p:spPr>
+        <p:txBody>
+          <a:bodyPr wrap="none" rtlCol="0">
+            <a:spAutoFit/>
+          </a:bodyPr>
+          <a:lstStyle/>
+          <a:p>
+            <a:r>
+              <a:rPr lang="en-ES" sz="1400" dirty="0"/>
+              <a:t>POST to Webhook</a:t>
+            </a:r>
+          </a:p>
+        </p:txBody>
+      </p:sp>
+      <p:pic>
+        <p:nvPicPr>
+          <p:cNvPr id="53" name="Picture 52" descr="A blue and white logo&#10;&#10;AI-generated content may be incorrect.">
+            <a:extLst>
+              <a:ext uri="{FF2B5EF4-FFF2-40B4-BE49-F238E27FC236}">
+                <a16:creationId xmlns:a16="http://schemas.microsoft.com/office/drawing/2014/main" id="{ED11721E-B45D-617F-9168-F5E0F011363C}"/>
+              </a:ext>
+            </a:extLst>
+          </p:cNvPr>
+          <p:cNvPicPr>
+            <a:picLocks noChangeAspect="1"/>
+          </p:cNvPicPr>
+          <p:nvPr/>
+        </p:nvPicPr>
+        <p:blipFill>
+          <a:blip r:embed="rId8"/>
+          <a:stretch>
+            <a:fillRect/>
+          </a:stretch>
+        </p:blipFill>
+        <p:spPr>
+          <a:xfrm>
+            <a:off x="917563" y="1802409"/>
+            <a:ext cx="621325" cy="584776"/>
+          </a:xfrm>
+          <a:prstGeom prst="rect">
+            <a:avLst/>
+          </a:prstGeom>
+        </p:spPr>
+      </p:pic>
+      <p:cxnSp>
+        <p:nvCxnSpPr>
+          <p:cNvPr id="54" name="Straight Arrow Connector 53">
+            <a:extLst>
+              <a:ext uri="{FF2B5EF4-FFF2-40B4-BE49-F238E27FC236}">
+                <a16:creationId xmlns:a16="http://schemas.microsoft.com/office/drawing/2014/main" id="{5BB595B0-8303-C568-63D0-B3C0A6210645}"/>
+              </a:ext>
+            </a:extLst>
+          </p:cNvPr>
+          <p:cNvCxnSpPr>
+            <a:cxnSpLocks/>
+          </p:cNvCxnSpPr>
+          <p:nvPr/>
+        </p:nvCxnSpPr>
+        <p:spPr>
+          <a:xfrm>
+            <a:off x="1550532" y="2648631"/>
+            <a:ext cx="2927831" cy="1056506"/>
+          </a:xfrm>
+          <a:prstGeom prst="straightConnector1">
+            <a:avLst/>
+          </a:prstGeom>
+          <a:ln>
+            <a:headEnd type="triangle"/>
+            <a:tailEnd type="none"/>
+          </a:ln>
+        </p:spPr>
+        <p:style>
+          <a:lnRef idx="2">
+            <a:schemeClr val="accent1"/>
+          </a:lnRef>
+          <a:fillRef idx="0">
+            <a:schemeClr val="accent1"/>
+          </a:fillRef>
+          <a:effectRef idx="1">
+            <a:schemeClr val="accent1"/>
+          </a:effectRef>
+          <a:fontRef idx="minor">
+            <a:schemeClr val="tx1"/>
+          </a:fontRef>
+        </p:style>
+      </p:cxnSp>
+      <p:cxnSp>
+        <p:nvCxnSpPr>
+          <p:cNvPr id="17" name="Straight Arrow Connector 16">
+            <a:extLst>
+              <a:ext uri="{FF2B5EF4-FFF2-40B4-BE49-F238E27FC236}">
+                <a16:creationId xmlns:a16="http://schemas.microsoft.com/office/drawing/2014/main" id="{33D153E8-3F58-55B5-595A-9515F8AB4C70}"/>
+              </a:ext>
+            </a:extLst>
+          </p:cNvPr>
+          <p:cNvCxnSpPr>
+            <a:cxnSpLocks/>
+          </p:cNvCxnSpPr>
+          <p:nvPr/>
+        </p:nvCxnSpPr>
+        <p:spPr>
+          <a:xfrm>
+            <a:off x="1627646" y="1952810"/>
+            <a:ext cx="7805388" cy="0"/>
+          </a:xfrm>
+          <a:prstGeom prst="straightConnector1">
+            <a:avLst/>
+          </a:prstGeom>
+          <a:ln>
+            <a:tailEnd type="triangle"/>
+          </a:ln>
+        </p:spPr>
+        <p:style>
+          <a:lnRef idx="2">
+            <a:schemeClr val="accent1"/>
+          </a:lnRef>
+          <a:fillRef idx="0">
+            <a:schemeClr val="accent1"/>
+          </a:fillRef>
+          <a:effectRef idx="1">
+            <a:schemeClr val="accent1"/>
+          </a:effectRef>
+          <a:fontRef idx="minor">
+            <a:schemeClr val="tx1"/>
+          </a:fontRef>
+        </p:style>
+      </p:cxnSp>
+      <p:sp>
+        <p:nvSpPr>
+          <p:cNvPr id="63" name="TextBox 62">
+            <a:extLst>
+              <a:ext uri="{FF2B5EF4-FFF2-40B4-BE49-F238E27FC236}">
+                <a16:creationId xmlns:a16="http://schemas.microsoft.com/office/drawing/2014/main" id="{AE77A3B9-E2EE-0DD6-AEDD-EF7163B9CAF2}"/>
+              </a:ext>
+            </a:extLst>
+          </p:cNvPr>
+          <p:cNvSpPr txBox="1"/>
+          <p:nvPr/>
+        </p:nvSpPr>
+        <p:spPr>
+          <a:xfrm>
+            <a:off x="2187946" y="2588394"/>
+            <a:ext cx="1758045" cy="307777"/>
+          </a:xfrm>
+          <a:prstGeom prst="rect">
+            <a:avLst/>
+          </a:prstGeom>
+          <a:noFill/>
+        </p:spPr>
+        <p:txBody>
+          <a:bodyPr wrap="none" rtlCol="0">
+            <a:spAutoFit/>
+          </a:bodyPr>
+          <a:lstStyle/>
+          <a:p>
+            <a:r>
+              <a:rPr lang="en-ES" sz="1400" dirty="0"/>
+              <a:t>Send via WebSocket</a:t>
+            </a:r>
+          </a:p>
+        </p:txBody>
+      </p:sp>
+      <p:cxnSp>
+        <p:nvCxnSpPr>
+          <p:cNvPr id="11" name="Straight Arrow Connector 10">
+            <a:extLst>
+              <a:ext uri="{FF2B5EF4-FFF2-40B4-BE49-F238E27FC236}">
+                <a16:creationId xmlns:a16="http://schemas.microsoft.com/office/drawing/2014/main" id="{783E3E3E-939A-A5D0-B445-A7A3CBE96767}"/>
+              </a:ext>
+            </a:extLst>
+          </p:cNvPr>
+          <p:cNvCxnSpPr>
+            <a:cxnSpLocks/>
+          </p:cNvCxnSpPr>
+          <p:nvPr/>
+        </p:nvCxnSpPr>
+        <p:spPr>
+          <a:xfrm flipV="1">
+            <a:off x="5248313" y="2547277"/>
+            <a:ext cx="4261826" cy="1212565"/>
+          </a:xfrm>
+          <a:prstGeom prst="straightConnector1">
+            <a:avLst/>
+          </a:prstGeom>
+          <a:ln>
+            <a:headEnd type="triangle"/>
+            <a:tailEnd type="none"/>
+          </a:ln>
+        </p:spPr>
+        <p:style>
+          <a:lnRef idx="2">
+            <a:schemeClr val="accent1"/>
+          </a:lnRef>
+          <a:fillRef idx="0">
+            <a:schemeClr val="accent1"/>
+          </a:fillRef>
+          <a:effectRef idx="1">
+            <a:schemeClr val="accent1"/>
+          </a:effectRef>
+          <a:fontRef idx="minor">
+            <a:schemeClr val="tx1"/>
+          </a:fontRef>
+        </p:style>
+      </p:cxnSp>
+      <p:sp>
+        <p:nvSpPr>
+          <p:cNvPr id="87" name="Title 1">
+            <a:extLst>
+              <a:ext uri="{FF2B5EF4-FFF2-40B4-BE49-F238E27FC236}">
+                <a16:creationId xmlns:a16="http://schemas.microsoft.com/office/drawing/2014/main" id="{CDFE5B86-B7E7-56C6-E8CA-95D2BF3D01F6}"/>
+              </a:ext>
+            </a:extLst>
+          </p:cNvPr>
+          <p:cNvSpPr txBox="1">
+            <a:spLocks/>
+          </p:cNvSpPr>
+          <p:nvPr/>
+        </p:nvSpPr>
+        <p:spPr>
+          <a:xfrm>
+            <a:off x="668840" y="126528"/>
+            <a:ext cx="10515600" cy="760409"/>
+          </a:xfrm>
+          <a:prstGeom prst="rect">
+            <a:avLst/>
+          </a:prstGeom>
+        </p:spPr>
+        <p:txBody>
+          <a:bodyPr vert="horz" lIns="91440" tIns="45720" rIns="91440" bIns="45720" rtlCol="0" anchor="b">
+            <a:normAutofit/>
+          </a:bodyPr>
+          <a:lstStyle>
+            <a:lvl1pPr algn="ctr" defTabSz="914400" rtl="0" eaLnBrk="1" latinLnBrk="0" hangingPunct="1">
+              <a:lnSpc>
+                <a:spcPct val="90000"/>
+              </a:lnSpc>
+              <a:spcBef>
+                <a:spcPct val="0"/>
+              </a:spcBef>
+              <a:buNone/>
+              <a:defRPr sz="6000" kern="1200">
+                <a:solidFill>
+                  <a:schemeClr val="tx1"/>
+                </a:solidFill>
+                <a:latin typeface="+mj-lt"/>
+                <a:ea typeface="+mj-ea"/>
+                <a:cs typeface="+mj-cs"/>
+              </a:defRPr>
+            </a:lvl1pPr>
+          </a:lstStyle>
+          <a:p>
+            <a:r>
+              <a:rPr lang="en-ES" sz="4400" b="1" dirty="0">
+                <a:solidFill>
+                  <a:srgbClr val="2F3649"/>
+                </a:solidFill>
+                <a:latin typeface="Arial Rounded MT Bold" panose="020F0704030504030204" pitchFamily="34" charset="77"/>
+              </a:rPr>
+              <a:t>Latch tu Flutter: Webhooks</a:t>
+            </a:r>
+          </a:p>
+        </p:txBody>
+      </p:sp>
+    </p:spTree>
+    <p:extLst>
+      <p:ext uri="{BB962C8B-B14F-4D97-AF65-F5344CB8AC3E}">
+        <p14:creationId xmlns:p14="http://schemas.microsoft.com/office/powerpoint/2010/main" val="3887690223"/>
       </p:ext>
     </p:extLst>
   </p:cSld>

</xml_diff>